<commit_message>
feat: Add logo support to PPTX slides (slides 1 and 5)
</commit_message>
<xml_diff>
--- a/docs/demo_slides.pptx
+++ b/docs/demo_slides.pptx
@@ -3143,54 +3143,30 @@
           </a:p>
         </p:txBody>
       </p:sp>
-      <p:sp>
-        <p:nvSpPr>
-          <p:cNvPr id="3" name="Oval 2"/>
-          <p:cNvSpPr/>
-          <p:nvPr/>
-        </p:nvSpPr>
-        <p:spPr>
-          <a:xfrm>
-            <a:off x="5029200" y="1371600"/>
-            <a:ext cx="2103120" cy="2103120"/>
-          </a:xfrm>
-          <a:prstGeom prst="ellipse">
-            <a:avLst/>
-          </a:prstGeom>
-          <a:solidFill>
-            <a:srgbClr val="34D399"/>
-          </a:solidFill>
-          <a:ln>
-            <a:noFill/>
-          </a:ln>
-        </p:spPr>
-        <p:style>
-          <a:lnRef idx="1">
-            <a:schemeClr val="accent1"/>
-          </a:lnRef>
-          <a:fillRef idx="3">
-            <a:schemeClr val="accent1"/>
-          </a:fillRef>
-          <a:effectRef idx="2">
-            <a:schemeClr val="accent1"/>
-          </a:effectRef>
-          <a:fontRef idx="minor">
-            <a:schemeClr val="lt1"/>
-          </a:fontRef>
-        </p:style>
-        <p:txBody>
-          <a:bodyPr rtlCol="0" anchor="ctr" wrap="square"/>
-          <a:lstStyle/>
-          <a:p>
-            <a:pPr algn="ctr">
-              <a:defRPr sz="6000"/>
-            </a:pPr>
-            <a:r>
-              <a:t>📄</a:t>
-            </a:r>
-          </a:p>
-        </p:txBody>
-      </p:sp>
+      <p:pic>
+        <p:nvPicPr>
+          <p:cNvPr id="3" name="Picture 2" descr="logo.png"/>
+          <p:cNvPicPr>
+            <a:picLocks noChangeAspect="1"/>
+          </p:cNvPicPr>
+          <p:nvPr/>
+        </p:nvPicPr>
+        <p:blipFill>
+          <a:blip r:embed="rId2"/>
+          <a:stretch>
+            <a:fillRect/>
+          </a:stretch>
+        </p:blipFill>
+        <p:spPr>
+          <a:xfrm>
+            <a:off x="8229600" y="1097280"/>
+            <a:ext cx="3200400" cy="3200400"/>
+          </a:xfrm>
+          <a:prstGeom prst="rect">
+            <a:avLst/>
+          </a:prstGeom>
+        </p:spPr>
+      </p:pic>
       <p:sp>
         <p:nvSpPr>
           <p:cNvPr id="4" name="TextBox 3"/>
@@ -6168,15 +6144,39 @@
           </a:p>
         </p:txBody>
       </p:sp>
-      <p:sp>
-        <p:nvSpPr>
-          <p:cNvPr id="3" name="TextBox 2"/>
+      <p:pic>
+        <p:nvPicPr>
+          <p:cNvPr id="3" name="Picture 2" descr="logo.png"/>
+          <p:cNvPicPr>
+            <a:picLocks noChangeAspect="1"/>
+          </p:cNvPicPr>
+          <p:nvPr/>
+        </p:nvPicPr>
+        <p:blipFill>
+          <a:blip r:embed="rId2"/>
+          <a:stretch>
+            <a:fillRect/>
+          </a:stretch>
+        </p:blipFill>
+        <p:spPr>
+          <a:xfrm>
+            <a:off x="4937760" y="457200"/>
+            <a:ext cx="2286000" cy="2286000"/>
+          </a:xfrm>
+          <a:prstGeom prst="rect">
+            <a:avLst/>
+          </a:prstGeom>
+        </p:spPr>
+      </p:pic>
+      <p:sp>
+        <p:nvSpPr>
+          <p:cNvPr id="4" name="TextBox 3"/>
           <p:cNvSpPr txBox="1"/>
           <p:nvPr/>
         </p:nvSpPr>
         <p:spPr>
           <a:xfrm>
-            <a:off x="914400" y="1371600"/>
+            <a:off x="914400" y="2926080"/>
             <a:ext cx="10058400" cy="1097280"/>
           </a:xfrm>
           <a:prstGeom prst="rect">
@@ -6206,7 +6206,7 @@
       </p:sp>
       <p:sp>
         <p:nvSpPr>
-          <p:cNvPr id="4" name="TextBox 3"/>
+          <p:cNvPr id="5" name="TextBox 4"/>
           <p:cNvSpPr txBox="1"/>
           <p:nvPr/>
         </p:nvSpPr>
@@ -6246,7 +6246,7 @@
       </p:sp>
       <p:sp>
         <p:nvSpPr>
-          <p:cNvPr id="5" name="Rounded Rectangle 4"/>
+          <p:cNvPr id="6" name="Rounded Rectangle 5"/>
           <p:cNvSpPr/>
           <p:nvPr/>
         </p:nvSpPr>
@@ -6289,7 +6289,7 @@
       </p:sp>
       <p:sp>
         <p:nvSpPr>
-          <p:cNvPr id="6" name="TextBox 5"/>
+          <p:cNvPr id="7" name="TextBox 6"/>
           <p:cNvSpPr txBox="1"/>
           <p:nvPr/>
         </p:nvSpPr>
@@ -6325,7 +6325,7 @@
       </p:sp>
       <p:sp>
         <p:nvSpPr>
-          <p:cNvPr id="7" name="TextBox 6"/>
+          <p:cNvPr id="8" name="TextBox 7"/>
           <p:cNvSpPr txBox="1"/>
           <p:nvPr/>
         </p:nvSpPr>
@@ -6361,7 +6361,7 @@
       </p:sp>
       <p:sp>
         <p:nvSpPr>
-          <p:cNvPr id="8" name="TextBox 7"/>
+          <p:cNvPr id="9" name="TextBox 8"/>
           <p:cNvSpPr txBox="1"/>
           <p:nvPr/>
         </p:nvSpPr>

</xml_diff>

<commit_message>
feat: Integrate architecture diagrams and Google AntiGravity into all demo materials
</commit_message>
<xml_diff>
--- a/docs/demo_slides.pptx
+++ b/docs/demo_slides.pptx
@@ -10,6 +10,8 @@
     <p:sldId id="258" r:id="rId9"/>
     <p:sldId id="259" r:id="rId10"/>
     <p:sldId id="260" r:id="rId11"/>
+    <p:sldId id="261" r:id="rId12"/>
+    <p:sldId id="262" r:id="rId13"/>
   </p:sldIdLst>
   <p:sldSz cx="12191695" cy="6858000" type="screen4x3"/>
   <p:notesSz cx="6858000" cy="9144000"/>
@@ -3920,7 +3922,7 @@
         </p:nvSpPr>
         <p:spPr>
           <a:xfrm>
-            <a:off x="731520" y="457200"/>
+            <a:off x="731520" y="274320"/>
             <a:ext cx="9144000" cy="731520"/>
           </a:xfrm>
           <a:prstGeom prst="rect">
@@ -3943,27 +3945,63 @@
               </a:defRPr>
             </a:pPr>
             <a:r>
-              <a:t>🤖 アーキテクチャ &amp; コア技術</a:t>
-            </a:r>
-          </a:p>
-        </p:txBody>
-      </p:sp>
-      <p:sp>
-        <p:nvSpPr>
-          <p:cNvPr id="3" name="Rounded Rectangle 2"/>
+              <a:t>Runtime Architecture</a:t>
+            </a:r>
+          </a:p>
+        </p:txBody>
+      </p:sp>
+      <p:sp>
+        <p:nvSpPr>
+          <p:cNvPr id="3" name="TextBox 2"/>
+          <p:cNvSpPr txBox="1"/>
+          <p:nvPr/>
+        </p:nvSpPr>
+        <p:spPr>
+          <a:xfrm>
+            <a:off x="731520" y="914400"/>
+            <a:ext cx="10058400" cy="365760"/>
+          </a:xfrm>
+          <a:prstGeom prst="rect">
+            <a:avLst/>
+          </a:prstGeom>
+          <a:noFill/>
+        </p:spPr>
+        <p:txBody>
+          <a:bodyPr wrap="square">
+            <a:spAutoFit/>
+          </a:bodyPr>
+          <a:lstStyle/>
+          <a:p>
+            <a:pPr algn="l">
+              <a:defRPr sz="1600" b="0">
+                <a:solidFill>
+                  <a:srgbClr val="34D399"/>
+                </a:solidFill>
+                <a:latin typeface="Segoe UI"/>
+              </a:defRPr>
+            </a:pPr>
+            <a:r>
+              <a:t>100% Google Cloud - Serverless &amp; Fully Managed</a:t>
+            </a:r>
+          </a:p>
+        </p:txBody>
+      </p:sp>
+      <p:sp>
+        <p:nvSpPr>
+          <p:cNvPr id="4" name="Rounded Rectangle 3"/>
           <p:cNvSpPr/>
           <p:nvPr/>
         </p:nvSpPr>
         <p:spPr>
           <a:xfrm>
-            <a:off x="457200" y="1645920"/>
-            <a:ext cx="2011680" cy="1828800"/>
+            <a:off x="457200" y="1371600"/>
+            <a:ext cx="11247120" cy="5212080"/>
           </a:xfrm>
           <a:prstGeom prst="roundRect">
             <a:avLst/>
           </a:prstGeom>
           <a:solidFill>
-            <a:srgbClr val="1E293B"/>
+            <a:srgbClr val="FFFFFF"/>
           </a:solidFill>
           <a:ln>
             <a:noFill/>
@@ -3991,1412 +4029,30 @@
           </a:p>
         </p:txBody>
       </p:sp>
-      <p:sp>
-        <p:nvSpPr>
-          <p:cNvPr id="4" name="TextBox 3"/>
-          <p:cNvSpPr txBox="1"/>
-          <p:nvPr/>
-        </p:nvSpPr>
-        <p:spPr>
-          <a:xfrm>
-            <a:off x="594360" y="1828800"/>
-            <a:ext cx="1737360" cy="457200"/>
-          </a:xfrm>
-          <a:prstGeom prst="rect">
-            <a:avLst/>
-          </a:prstGeom>
-          <a:noFill/>
-        </p:spPr>
-        <p:txBody>
-          <a:bodyPr wrap="square">
-            <a:spAutoFit/>
-          </a:bodyPr>
-          <a:lstStyle/>
-          <a:p>
-            <a:pPr algn="ctr">
-              <a:defRPr sz="1600" b="1">
-                <a:solidFill>
-                  <a:srgbClr val="38BDF8"/>
-                </a:solidFill>
-                <a:latin typeface="Segoe UI"/>
-              </a:defRPr>
-            </a:pPr>
-            <a:r>
-              <a:t>1. 取得</a:t>
-            </a:r>
-          </a:p>
-        </p:txBody>
-      </p:sp>
-      <p:sp>
-        <p:nvSpPr>
-          <p:cNvPr id="5" name="TextBox 4"/>
-          <p:cNvSpPr txBox="1"/>
-          <p:nvPr/>
-        </p:nvSpPr>
-        <p:spPr>
-          <a:xfrm>
-            <a:off x="594360" y="2377440"/>
-            <a:ext cx="1737360" cy="914400"/>
-          </a:xfrm>
-          <a:prstGeom prst="rect">
-            <a:avLst/>
-          </a:prstGeom>
-          <a:noFill/>
-        </p:spPr>
-        <p:txBody>
-          <a:bodyPr wrap="square">
-            <a:spAutoFit/>
-          </a:bodyPr>
-          <a:lstStyle/>
-          <a:p>
-            <a:pPr algn="ctr">
-              <a:defRPr sz="1300" b="0">
-                <a:solidFill>
-                  <a:srgbClr val="A0A0B0"/>
-                </a:solidFill>
-                <a:latin typeface="Segoe UI"/>
-              </a:defRPr>
-            </a:pPr>
-            <a:r>
-              <a:t>Google Drive</a:t>
-            </a:r>
-            <a:br/>
-            <a:r>
-              <a:t>から文書取得</a:t>
-            </a:r>
-          </a:p>
-        </p:txBody>
-      </p:sp>
-      <p:sp>
-        <p:nvSpPr>
-          <p:cNvPr id="6" name="TextBox 5"/>
-          <p:cNvSpPr txBox="1"/>
-          <p:nvPr/>
-        </p:nvSpPr>
-        <p:spPr>
-          <a:xfrm>
-            <a:off x="2468880" y="2286000"/>
-            <a:ext cx="274320" cy="457200"/>
-          </a:xfrm>
-          <a:prstGeom prst="rect">
-            <a:avLst/>
-          </a:prstGeom>
-          <a:noFill/>
-        </p:spPr>
-        <p:txBody>
-          <a:bodyPr wrap="square">
-            <a:spAutoFit/>
-          </a:bodyPr>
-          <a:lstStyle/>
-          <a:p>
-            <a:pPr algn="ctr">
-              <a:defRPr sz="2400" b="0">
-                <a:solidFill>
-                  <a:srgbClr val="34D399"/>
-                </a:solidFill>
-                <a:latin typeface="Segoe UI"/>
-              </a:defRPr>
-            </a:pPr>
-            <a:r>
-              <a:t>→</a:t>
-            </a:r>
-          </a:p>
-        </p:txBody>
-      </p:sp>
-      <p:sp>
-        <p:nvSpPr>
-          <p:cNvPr id="7" name="Rounded Rectangle 6"/>
-          <p:cNvSpPr/>
-          <p:nvPr/>
-        </p:nvSpPr>
-        <p:spPr>
-          <a:xfrm>
-            <a:off x="2743200" y="1645920"/>
-            <a:ext cx="2011680" cy="1828800"/>
-          </a:xfrm>
-          <a:prstGeom prst="roundRect">
-            <a:avLst/>
-          </a:prstGeom>
-          <a:solidFill>
-            <a:srgbClr val="1E293B"/>
-          </a:solidFill>
-          <a:ln>
-            <a:noFill/>
-          </a:ln>
-        </p:spPr>
-        <p:style>
-          <a:lnRef idx="1">
-            <a:schemeClr val="accent1"/>
-          </a:lnRef>
-          <a:fillRef idx="3">
-            <a:schemeClr val="accent1"/>
-          </a:fillRef>
-          <a:effectRef idx="2">
-            <a:schemeClr val="accent1"/>
-          </a:effectRef>
-          <a:fontRef idx="minor">
-            <a:schemeClr val="lt1"/>
-          </a:fontRef>
-        </p:style>
-        <p:txBody>
-          <a:bodyPr rtlCol="0" anchor="ctr"/>
-          <a:lstStyle/>
-          <a:p>
-            <a:pPr algn="ctr"/>
-          </a:p>
-        </p:txBody>
-      </p:sp>
-      <p:sp>
-        <p:nvSpPr>
-          <p:cNvPr id="8" name="TextBox 7"/>
-          <p:cNvSpPr txBox="1"/>
-          <p:nvPr/>
-        </p:nvSpPr>
-        <p:spPr>
-          <a:xfrm>
-            <a:off x="2880360" y="1828800"/>
-            <a:ext cx="1737360" cy="457200"/>
-          </a:xfrm>
-          <a:prstGeom prst="rect">
-            <a:avLst/>
-          </a:prstGeom>
-          <a:noFill/>
-        </p:spPr>
-        <p:txBody>
-          <a:bodyPr wrap="square">
-            <a:spAutoFit/>
-          </a:bodyPr>
-          <a:lstStyle/>
-          <a:p>
-            <a:pPr algn="ctr">
-              <a:defRPr sz="1600" b="1">
-                <a:solidFill>
-                  <a:srgbClr val="38BDF8"/>
-                </a:solidFill>
-                <a:latin typeface="Segoe UI"/>
-              </a:defRPr>
-            </a:pPr>
-            <a:r>
-              <a:t>2. 検索</a:t>
-            </a:r>
-          </a:p>
-        </p:txBody>
-      </p:sp>
-      <p:sp>
-        <p:nvSpPr>
-          <p:cNvPr id="9" name="TextBox 8"/>
-          <p:cNvSpPr txBox="1"/>
-          <p:nvPr/>
-        </p:nvSpPr>
-        <p:spPr>
-          <a:xfrm>
-            <a:off x="2880360" y="2377440"/>
-            <a:ext cx="1737360" cy="914400"/>
-          </a:xfrm>
-          <a:prstGeom prst="rect">
-            <a:avLst/>
-          </a:prstGeom>
-          <a:noFill/>
-        </p:spPr>
-        <p:txBody>
-          <a:bodyPr wrap="square">
-            <a:spAutoFit/>
-          </a:bodyPr>
-          <a:lstStyle/>
-          <a:p>
-            <a:pPr algn="ctr">
-              <a:defRPr sz="1300" b="0">
-                <a:solidFill>
-                  <a:srgbClr val="A0A0B0"/>
-                </a:solidFill>
-                <a:latin typeface="Segoe UI"/>
-              </a:defRPr>
-            </a:pPr>
-            <a:r>
-              <a:t>Agent Builder</a:t>
-            </a:r>
-            <a:br/>
-            <a:r>
-              <a:t>で関連文書検索</a:t>
-            </a:r>
-          </a:p>
-        </p:txBody>
-      </p:sp>
-      <p:sp>
-        <p:nvSpPr>
-          <p:cNvPr id="10" name="TextBox 9"/>
-          <p:cNvSpPr txBox="1"/>
-          <p:nvPr/>
-        </p:nvSpPr>
-        <p:spPr>
-          <a:xfrm>
-            <a:off x="4754880" y="2286000"/>
-            <a:ext cx="274320" cy="457200"/>
-          </a:xfrm>
-          <a:prstGeom prst="rect">
-            <a:avLst/>
-          </a:prstGeom>
-          <a:noFill/>
-        </p:spPr>
-        <p:txBody>
-          <a:bodyPr wrap="square">
-            <a:spAutoFit/>
-          </a:bodyPr>
-          <a:lstStyle/>
-          <a:p>
-            <a:pPr algn="ctr">
-              <a:defRPr sz="2400" b="0">
-                <a:solidFill>
-                  <a:srgbClr val="34D399"/>
-                </a:solidFill>
-                <a:latin typeface="Segoe UI"/>
-              </a:defRPr>
-            </a:pPr>
-            <a:r>
-              <a:t>→</a:t>
-            </a:r>
-          </a:p>
-        </p:txBody>
-      </p:sp>
-      <p:sp>
-        <p:nvSpPr>
-          <p:cNvPr id="11" name="Rounded Rectangle 10"/>
-          <p:cNvSpPr/>
-          <p:nvPr/>
-        </p:nvSpPr>
-        <p:spPr>
-          <a:xfrm>
-            <a:off x="5029200" y="1645920"/>
-            <a:ext cx="2011680" cy="1828800"/>
-          </a:xfrm>
-          <a:prstGeom prst="roundRect">
-            <a:avLst/>
-          </a:prstGeom>
-          <a:solidFill>
-            <a:srgbClr val="1E293B"/>
-          </a:solidFill>
-          <a:ln>
-            <a:noFill/>
-          </a:ln>
-        </p:spPr>
-        <p:style>
-          <a:lnRef idx="1">
-            <a:schemeClr val="accent1"/>
-          </a:lnRef>
-          <a:fillRef idx="3">
-            <a:schemeClr val="accent1"/>
-          </a:fillRef>
-          <a:effectRef idx="2">
-            <a:schemeClr val="accent1"/>
-          </a:effectRef>
-          <a:fontRef idx="minor">
-            <a:schemeClr val="lt1"/>
-          </a:fontRef>
-        </p:style>
-        <p:txBody>
-          <a:bodyPr rtlCol="0" anchor="ctr"/>
-          <a:lstStyle/>
-          <a:p>
-            <a:pPr algn="ctr"/>
-          </a:p>
-        </p:txBody>
-      </p:sp>
-      <p:sp>
-        <p:nvSpPr>
-          <p:cNvPr id="12" name="TextBox 11"/>
-          <p:cNvSpPr txBox="1"/>
-          <p:nvPr/>
-        </p:nvSpPr>
-        <p:spPr>
-          <a:xfrm>
-            <a:off x="5166360" y="1828800"/>
-            <a:ext cx="1737360" cy="457200"/>
-          </a:xfrm>
-          <a:prstGeom prst="rect">
-            <a:avLst/>
-          </a:prstGeom>
-          <a:noFill/>
-        </p:spPr>
-        <p:txBody>
-          <a:bodyPr wrap="square">
-            <a:spAutoFit/>
-          </a:bodyPr>
-          <a:lstStyle/>
-          <a:p>
-            <a:pPr algn="ctr">
-              <a:defRPr sz="1600" b="1">
-                <a:solidFill>
-                  <a:srgbClr val="34D399"/>
-                </a:solidFill>
-                <a:latin typeface="Segoe UI"/>
-              </a:defRPr>
-            </a:pPr>
-            <a:r>
-              <a:t>3. 分析</a:t>
-            </a:r>
-          </a:p>
-        </p:txBody>
-      </p:sp>
-      <p:sp>
-        <p:nvSpPr>
-          <p:cNvPr id="13" name="TextBox 12"/>
-          <p:cNvSpPr txBox="1"/>
-          <p:nvPr/>
-        </p:nvSpPr>
-        <p:spPr>
-          <a:xfrm>
-            <a:off x="5166360" y="2377440"/>
-            <a:ext cx="1737360" cy="914400"/>
-          </a:xfrm>
-          <a:prstGeom prst="rect">
-            <a:avLst/>
-          </a:prstGeom>
-          <a:noFill/>
-        </p:spPr>
-        <p:txBody>
-          <a:bodyPr wrap="square">
-            <a:spAutoFit/>
-          </a:bodyPr>
-          <a:lstStyle/>
-          <a:p>
-            <a:pPr algn="ctr">
-              <a:defRPr sz="1300" b="0">
-                <a:solidFill>
-                  <a:srgbClr val="A0A0B0"/>
-                </a:solidFill>
-                <a:latin typeface="Segoe UI"/>
-              </a:defRPr>
-            </a:pPr>
-            <a:r>
-              <a:t>Gemini 2.0</a:t>
-            </a:r>
-            <a:br/>
-            <a:r>
-              <a:t>テキスト矛盾検出</a:t>
-            </a:r>
-          </a:p>
-        </p:txBody>
-      </p:sp>
-      <p:sp>
-        <p:nvSpPr>
-          <p:cNvPr id="14" name="TextBox 13"/>
-          <p:cNvSpPr txBox="1"/>
-          <p:nvPr/>
-        </p:nvSpPr>
-        <p:spPr>
-          <a:xfrm>
-            <a:off x="7040880" y="2286000"/>
-            <a:ext cx="274320" cy="457200"/>
-          </a:xfrm>
-          <a:prstGeom prst="rect">
-            <a:avLst/>
-          </a:prstGeom>
-          <a:noFill/>
-        </p:spPr>
-        <p:txBody>
-          <a:bodyPr wrap="square">
-            <a:spAutoFit/>
-          </a:bodyPr>
-          <a:lstStyle/>
-          <a:p>
-            <a:pPr algn="ctr">
-              <a:defRPr sz="2400" b="0">
-                <a:solidFill>
-                  <a:srgbClr val="34D399"/>
-                </a:solidFill>
-                <a:latin typeface="Segoe UI"/>
-              </a:defRPr>
-            </a:pPr>
-            <a:r>
-              <a:t>→</a:t>
-            </a:r>
-          </a:p>
-        </p:txBody>
-      </p:sp>
-      <p:sp>
-        <p:nvSpPr>
-          <p:cNvPr id="15" name="Rounded Rectangle 14"/>
-          <p:cNvSpPr/>
-          <p:nvPr/>
-        </p:nvSpPr>
-        <p:spPr>
-          <a:xfrm>
-            <a:off x="7315200" y="1645920"/>
-            <a:ext cx="2011680" cy="1828800"/>
-          </a:xfrm>
-          <a:prstGeom prst="roundRect">
-            <a:avLst/>
-          </a:prstGeom>
-          <a:solidFill>
-            <a:srgbClr val="1E293B"/>
-          </a:solidFill>
-          <a:ln>
-            <a:noFill/>
-          </a:ln>
-        </p:spPr>
-        <p:style>
-          <a:lnRef idx="1">
-            <a:schemeClr val="accent1"/>
-          </a:lnRef>
-          <a:fillRef idx="3">
-            <a:schemeClr val="accent1"/>
-          </a:fillRef>
-          <a:effectRef idx="2">
-            <a:schemeClr val="accent1"/>
-          </a:effectRef>
-          <a:fontRef idx="minor">
-            <a:schemeClr val="lt1"/>
-          </a:fontRef>
-        </p:style>
-        <p:txBody>
-          <a:bodyPr rtlCol="0" anchor="ctr"/>
-          <a:lstStyle/>
-          <a:p>
-            <a:pPr algn="ctr"/>
-          </a:p>
-        </p:txBody>
-      </p:sp>
-      <p:sp>
-        <p:nvSpPr>
-          <p:cNvPr id="16" name="TextBox 15"/>
-          <p:cNvSpPr txBox="1"/>
-          <p:nvPr/>
-        </p:nvSpPr>
-        <p:spPr>
-          <a:xfrm>
-            <a:off x="7452360" y="1828800"/>
-            <a:ext cx="1737360" cy="457200"/>
-          </a:xfrm>
-          <a:prstGeom prst="rect">
-            <a:avLst/>
-          </a:prstGeom>
-          <a:noFill/>
-        </p:spPr>
-        <p:txBody>
-          <a:bodyPr wrap="square">
-            <a:spAutoFit/>
-          </a:bodyPr>
-          <a:lstStyle/>
-          <a:p>
-            <a:pPr algn="ctr">
-              <a:defRPr sz="1600" b="1">
-                <a:solidFill>
-                  <a:srgbClr val="34D399"/>
-                </a:solidFill>
-                <a:latin typeface="Segoe UI"/>
-              </a:defRPr>
-            </a:pPr>
-            <a:r>
-              <a:t>4. 画像</a:t>
-            </a:r>
-          </a:p>
-        </p:txBody>
-      </p:sp>
-      <p:sp>
-        <p:nvSpPr>
-          <p:cNvPr id="17" name="TextBox 16"/>
-          <p:cNvSpPr txBox="1"/>
-          <p:nvPr/>
-        </p:nvSpPr>
-        <p:spPr>
-          <a:xfrm>
-            <a:off x="7452360" y="2377440"/>
-            <a:ext cx="1737360" cy="914400"/>
-          </a:xfrm>
-          <a:prstGeom prst="rect">
-            <a:avLst/>
-          </a:prstGeom>
-          <a:noFill/>
-        </p:spPr>
-        <p:txBody>
-          <a:bodyPr wrap="square">
-            <a:spAutoFit/>
-          </a:bodyPr>
-          <a:lstStyle/>
-          <a:p>
-            <a:pPr algn="ctr">
-              <a:defRPr sz="1300" b="0">
-                <a:solidFill>
-                  <a:srgbClr val="A0A0B0"/>
-                </a:solidFill>
-                <a:latin typeface="Segoe UI"/>
-              </a:defRPr>
-            </a:pPr>
-            <a:r>
-              <a:t>Gemini 2.0</a:t>
-            </a:r>
-            <a:br/>
-            <a:r>
-              <a:t>スクショ劣化検出</a:t>
-            </a:r>
-          </a:p>
-        </p:txBody>
-      </p:sp>
-      <p:sp>
-        <p:nvSpPr>
-          <p:cNvPr id="18" name="TextBox 17"/>
-          <p:cNvSpPr txBox="1"/>
-          <p:nvPr/>
-        </p:nvSpPr>
-        <p:spPr>
-          <a:xfrm>
-            <a:off x="9326880" y="2286000"/>
-            <a:ext cx="274320" cy="457200"/>
-          </a:xfrm>
-          <a:prstGeom prst="rect">
-            <a:avLst/>
-          </a:prstGeom>
-          <a:noFill/>
-        </p:spPr>
-        <p:txBody>
-          <a:bodyPr wrap="square">
-            <a:spAutoFit/>
-          </a:bodyPr>
-          <a:lstStyle/>
-          <a:p>
-            <a:pPr algn="ctr">
-              <a:defRPr sz="2400" b="0">
-                <a:solidFill>
-                  <a:srgbClr val="34D399"/>
-                </a:solidFill>
-                <a:latin typeface="Segoe UI"/>
-              </a:defRPr>
-            </a:pPr>
-            <a:r>
-              <a:t>→</a:t>
-            </a:r>
-          </a:p>
-        </p:txBody>
-      </p:sp>
-      <p:sp>
-        <p:nvSpPr>
-          <p:cNvPr id="19" name="Rounded Rectangle 18"/>
-          <p:cNvSpPr/>
-          <p:nvPr/>
-        </p:nvSpPr>
-        <p:spPr>
-          <a:xfrm>
-            <a:off x="9601200" y="1645920"/>
-            <a:ext cx="2011680" cy="1828800"/>
-          </a:xfrm>
-          <a:prstGeom prst="roundRect">
-            <a:avLst/>
-          </a:prstGeom>
-          <a:solidFill>
-            <a:srgbClr val="1E293B"/>
-          </a:solidFill>
-          <a:ln>
-            <a:noFill/>
-          </a:ln>
-        </p:spPr>
-        <p:style>
-          <a:lnRef idx="1">
-            <a:schemeClr val="accent1"/>
-          </a:lnRef>
-          <a:fillRef idx="3">
-            <a:schemeClr val="accent1"/>
-          </a:fillRef>
-          <a:effectRef idx="2">
-            <a:schemeClr val="accent1"/>
-          </a:effectRef>
-          <a:fontRef idx="minor">
-            <a:schemeClr val="lt1"/>
-          </a:fontRef>
-        </p:style>
-        <p:txBody>
-          <a:bodyPr rtlCol="0" anchor="ctr"/>
-          <a:lstStyle/>
-          <a:p>
-            <a:pPr algn="ctr"/>
-          </a:p>
-        </p:txBody>
-      </p:sp>
-      <p:sp>
-        <p:nvSpPr>
-          <p:cNvPr id="20" name="TextBox 19"/>
-          <p:cNvSpPr txBox="1"/>
-          <p:nvPr/>
-        </p:nvSpPr>
-        <p:spPr>
-          <a:xfrm>
-            <a:off x="9738360" y="1828800"/>
-            <a:ext cx="1737360" cy="457200"/>
-          </a:xfrm>
-          <a:prstGeom prst="rect">
-            <a:avLst/>
-          </a:prstGeom>
-          <a:noFill/>
-        </p:spPr>
-        <p:txBody>
-          <a:bodyPr wrap="square">
-            <a:spAutoFit/>
-          </a:bodyPr>
-          <a:lstStyle/>
-          <a:p>
-            <a:pPr algn="ctr">
-              <a:defRPr sz="1600" b="1">
-                <a:solidFill>
-                  <a:srgbClr val="38BDF8"/>
-                </a:solidFill>
-                <a:latin typeface="Segoe UI"/>
-              </a:defRPr>
-            </a:pPr>
-            <a:r>
-              <a:t>5. 提案</a:t>
-            </a:r>
-          </a:p>
-        </p:txBody>
-      </p:sp>
-      <p:sp>
-        <p:nvSpPr>
-          <p:cNvPr id="21" name="TextBox 20"/>
-          <p:cNvSpPr txBox="1"/>
-          <p:nvPr/>
-        </p:nvSpPr>
-        <p:spPr>
-          <a:xfrm>
-            <a:off x="9738360" y="2377440"/>
-            <a:ext cx="1737360" cy="914400"/>
-          </a:xfrm>
-          <a:prstGeom prst="rect">
-            <a:avLst/>
-          </a:prstGeom>
-          <a:noFill/>
-        </p:spPr>
-        <p:txBody>
-          <a:bodyPr wrap="square">
-            <a:spAutoFit/>
-          </a:bodyPr>
-          <a:lstStyle/>
-          <a:p>
-            <a:pPr algn="ctr">
-              <a:defRPr sz="1300" b="0">
-                <a:solidFill>
-                  <a:srgbClr val="A0A0B0"/>
-                </a:solidFill>
-                <a:latin typeface="Segoe UI"/>
-              </a:defRPr>
-            </a:pPr>
-            <a:r>
-              <a:t>修正提案</a:t>
-            </a:r>
-            <a:br/>
-            <a:r>
-              <a:t>自動生成</a:t>
-            </a:r>
-          </a:p>
-        </p:txBody>
-      </p:sp>
-      <p:sp>
-        <p:nvSpPr>
-          <p:cNvPr id="22" name="TextBox 21"/>
-          <p:cNvSpPr txBox="1"/>
-          <p:nvPr/>
-        </p:nvSpPr>
-        <p:spPr>
-          <a:xfrm>
-            <a:off x="731520" y="3840480"/>
-            <a:ext cx="4572000" cy="457200"/>
-          </a:xfrm>
-          <a:prstGeom prst="rect">
-            <a:avLst/>
-          </a:prstGeom>
-          <a:noFill/>
-        </p:spPr>
-        <p:txBody>
-          <a:bodyPr wrap="square">
-            <a:spAutoFit/>
-          </a:bodyPr>
-          <a:lstStyle/>
-          <a:p>
-            <a:pPr algn="l">
-              <a:defRPr sz="1800" b="1">
-                <a:solidFill>
-                  <a:srgbClr val="38BDF8"/>
-                </a:solidFill>
-                <a:latin typeface="Segoe UI"/>
-              </a:defRPr>
-            </a:pPr>
-            <a:r>
-              <a:t>☁️ Google Cloud サービス</a:t>
-            </a:r>
-          </a:p>
-        </p:txBody>
-      </p:sp>
-      <p:sp>
-        <p:nvSpPr>
-          <p:cNvPr id="23" name="Rounded Rectangle 22"/>
-          <p:cNvSpPr/>
-          <p:nvPr/>
-        </p:nvSpPr>
-        <p:spPr>
-          <a:xfrm>
-            <a:off x="457200" y="4389120"/>
-            <a:ext cx="2011680" cy="1371600"/>
-          </a:xfrm>
-          <a:prstGeom prst="roundRect">
-            <a:avLst/>
-          </a:prstGeom>
-          <a:solidFill>
-            <a:srgbClr val="1E293B"/>
-          </a:solidFill>
-          <a:ln>
-            <a:noFill/>
-          </a:ln>
-        </p:spPr>
-        <p:style>
-          <a:lnRef idx="1">
-            <a:schemeClr val="accent1"/>
-          </a:lnRef>
-          <a:fillRef idx="3">
-            <a:schemeClr val="accent1"/>
-          </a:fillRef>
-          <a:effectRef idx="2">
-            <a:schemeClr val="accent1"/>
-          </a:effectRef>
-          <a:fontRef idx="minor">
-            <a:schemeClr val="lt1"/>
-          </a:fontRef>
-        </p:style>
-        <p:txBody>
-          <a:bodyPr rtlCol="0" anchor="ctr"/>
-          <a:lstStyle/>
-          <a:p>
-            <a:pPr algn="ctr"/>
-          </a:p>
-        </p:txBody>
-      </p:sp>
-      <p:sp>
-        <p:nvSpPr>
-          <p:cNvPr id="24" name="TextBox 23"/>
-          <p:cNvSpPr txBox="1"/>
-          <p:nvPr/>
-        </p:nvSpPr>
-        <p:spPr>
-          <a:xfrm>
-            <a:off x="594360" y="4526280"/>
-            <a:ext cx="1737360" cy="365760"/>
-          </a:xfrm>
-          <a:prstGeom prst="rect">
-            <a:avLst/>
-          </a:prstGeom>
-          <a:noFill/>
-        </p:spPr>
-        <p:txBody>
-          <a:bodyPr wrap="square">
-            <a:spAutoFit/>
-          </a:bodyPr>
-          <a:lstStyle/>
-          <a:p>
-            <a:pPr algn="ctr">
-              <a:defRPr sz="1500" b="1">
-                <a:solidFill>
-                  <a:srgbClr val="38BDF8"/>
-                </a:solidFill>
-                <a:latin typeface="Segoe UI"/>
-              </a:defRPr>
-            </a:pPr>
-            <a:r>
-              <a:t>Cloud Run</a:t>
-            </a:r>
-          </a:p>
-        </p:txBody>
-      </p:sp>
-      <p:sp>
-        <p:nvSpPr>
-          <p:cNvPr id="25" name="TextBox 24"/>
-          <p:cNvSpPr txBox="1"/>
-          <p:nvPr/>
-        </p:nvSpPr>
-        <p:spPr>
-          <a:xfrm>
-            <a:off x="594360" y="4937760"/>
-            <a:ext cx="1737360" cy="731520"/>
-          </a:xfrm>
-          <a:prstGeom prst="rect">
-            <a:avLst/>
-          </a:prstGeom>
-          <a:noFill/>
-        </p:spPr>
-        <p:txBody>
-          <a:bodyPr wrap="square">
-            <a:spAutoFit/>
-          </a:bodyPr>
-          <a:lstStyle/>
-          <a:p>
-            <a:pPr algn="ctr">
-              <a:defRPr sz="1200" b="0">
-                <a:solidFill>
-                  <a:srgbClr val="A0A0B0"/>
-                </a:solidFill>
-                <a:latin typeface="Segoe UI"/>
-              </a:defRPr>
-            </a:pPr>
-            <a:r>
-              <a:t>サーバーレス</a:t>
-            </a:r>
-            <a:br/>
-            <a:r>
-              <a:t>ホスティング</a:t>
-            </a:r>
-          </a:p>
-        </p:txBody>
-      </p:sp>
-      <p:sp>
-        <p:nvSpPr>
-          <p:cNvPr id="26" name="Rounded Rectangle 25"/>
-          <p:cNvSpPr/>
-          <p:nvPr/>
-        </p:nvSpPr>
-        <p:spPr>
-          <a:xfrm>
-            <a:off x="2743200" y="4389120"/>
-            <a:ext cx="2011680" cy="1371600"/>
-          </a:xfrm>
-          <a:prstGeom prst="roundRect">
-            <a:avLst/>
-          </a:prstGeom>
-          <a:solidFill>
-            <a:srgbClr val="1E293B"/>
-          </a:solidFill>
-          <a:ln>
-            <a:noFill/>
-          </a:ln>
-        </p:spPr>
-        <p:style>
-          <a:lnRef idx="1">
-            <a:schemeClr val="accent1"/>
-          </a:lnRef>
-          <a:fillRef idx="3">
-            <a:schemeClr val="accent1"/>
-          </a:fillRef>
-          <a:effectRef idx="2">
-            <a:schemeClr val="accent1"/>
-          </a:effectRef>
-          <a:fontRef idx="minor">
-            <a:schemeClr val="lt1"/>
-          </a:fontRef>
-        </p:style>
-        <p:txBody>
-          <a:bodyPr rtlCol="0" anchor="ctr"/>
-          <a:lstStyle/>
-          <a:p>
-            <a:pPr algn="ctr"/>
-          </a:p>
-        </p:txBody>
-      </p:sp>
-      <p:sp>
-        <p:nvSpPr>
-          <p:cNvPr id="27" name="TextBox 26"/>
-          <p:cNvSpPr txBox="1"/>
-          <p:nvPr/>
-        </p:nvSpPr>
-        <p:spPr>
-          <a:xfrm>
-            <a:off x="2880360" y="4526280"/>
-            <a:ext cx="1737360" cy="365760"/>
-          </a:xfrm>
-          <a:prstGeom prst="rect">
-            <a:avLst/>
-          </a:prstGeom>
-          <a:noFill/>
-        </p:spPr>
-        <p:txBody>
-          <a:bodyPr wrap="square">
-            <a:spAutoFit/>
-          </a:bodyPr>
-          <a:lstStyle/>
-          <a:p>
-            <a:pPr algn="ctr">
-              <a:defRPr sz="1500" b="1">
-                <a:solidFill>
-                  <a:srgbClr val="38BDF8"/>
-                </a:solidFill>
-                <a:latin typeface="Segoe UI"/>
-              </a:defRPr>
-            </a:pPr>
-            <a:r>
-              <a:t>Firestore</a:t>
-            </a:r>
-          </a:p>
-        </p:txBody>
-      </p:sp>
-      <p:sp>
-        <p:nvSpPr>
-          <p:cNvPr id="28" name="TextBox 27"/>
-          <p:cNvSpPr txBox="1"/>
-          <p:nvPr/>
-        </p:nvSpPr>
-        <p:spPr>
-          <a:xfrm>
-            <a:off x="2880360" y="4937760"/>
-            <a:ext cx="1737360" cy="731520"/>
-          </a:xfrm>
-          <a:prstGeom prst="rect">
-            <a:avLst/>
-          </a:prstGeom>
-          <a:noFill/>
-        </p:spPr>
-        <p:txBody>
-          <a:bodyPr wrap="square">
-            <a:spAutoFit/>
-          </a:bodyPr>
-          <a:lstStyle/>
-          <a:p>
-            <a:pPr algn="ctr">
-              <a:defRPr sz="1200" b="0">
-                <a:solidFill>
-                  <a:srgbClr val="A0A0B0"/>
-                </a:solidFill>
-                <a:latin typeface="Segoe UI"/>
-              </a:defRPr>
-            </a:pPr>
-            <a:r>
-              <a:t>スキャン結果</a:t>
-            </a:r>
-            <a:br/>
-            <a:r>
-              <a:t>保存</a:t>
-            </a:r>
-          </a:p>
-        </p:txBody>
-      </p:sp>
-      <p:sp>
-        <p:nvSpPr>
-          <p:cNvPr id="29" name="Rounded Rectangle 28"/>
-          <p:cNvSpPr/>
-          <p:nvPr/>
-        </p:nvSpPr>
-        <p:spPr>
-          <a:xfrm>
-            <a:off x="5029200" y="4389120"/>
-            <a:ext cx="2011680" cy="1371600"/>
-          </a:xfrm>
-          <a:prstGeom prst="roundRect">
-            <a:avLst/>
-          </a:prstGeom>
-          <a:solidFill>
-            <a:srgbClr val="1E293B"/>
-          </a:solidFill>
-          <a:ln>
-            <a:noFill/>
-          </a:ln>
-        </p:spPr>
-        <p:style>
-          <a:lnRef idx="1">
-            <a:schemeClr val="accent1"/>
-          </a:lnRef>
-          <a:fillRef idx="3">
-            <a:schemeClr val="accent1"/>
-          </a:fillRef>
-          <a:effectRef idx="2">
-            <a:schemeClr val="accent1"/>
-          </a:effectRef>
-          <a:fontRef idx="minor">
-            <a:schemeClr val="lt1"/>
-          </a:fontRef>
-        </p:style>
-        <p:txBody>
-          <a:bodyPr rtlCol="0" anchor="ctr"/>
-          <a:lstStyle/>
-          <a:p>
-            <a:pPr algn="ctr"/>
-          </a:p>
-        </p:txBody>
-      </p:sp>
-      <p:sp>
-        <p:nvSpPr>
-          <p:cNvPr id="30" name="TextBox 29"/>
-          <p:cNvSpPr txBox="1"/>
-          <p:nvPr/>
-        </p:nvSpPr>
-        <p:spPr>
-          <a:xfrm>
-            <a:off x="5166360" y="4526280"/>
-            <a:ext cx="1737360" cy="365760"/>
-          </a:xfrm>
-          <a:prstGeom prst="rect">
-            <a:avLst/>
-          </a:prstGeom>
-          <a:noFill/>
-        </p:spPr>
-        <p:txBody>
-          <a:bodyPr wrap="square">
-            <a:spAutoFit/>
-          </a:bodyPr>
-          <a:lstStyle/>
-          <a:p>
-            <a:pPr algn="ctr">
-              <a:defRPr sz="1500" b="1">
-                <a:solidFill>
-                  <a:srgbClr val="38BDF8"/>
-                </a:solidFill>
-                <a:latin typeface="Segoe UI"/>
-              </a:defRPr>
-            </a:pPr>
-            <a:r>
-              <a:t>GCS</a:t>
-            </a:r>
-          </a:p>
-        </p:txBody>
-      </p:sp>
-      <p:sp>
-        <p:nvSpPr>
-          <p:cNvPr id="31" name="TextBox 30"/>
-          <p:cNvSpPr txBox="1"/>
-          <p:nvPr/>
-        </p:nvSpPr>
-        <p:spPr>
-          <a:xfrm>
-            <a:off x="5166360" y="4937760"/>
-            <a:ext cx="1737360" cy="731520"/>
-          </a:xfrm>
-          <a:prstGeom prst="rect">
-            <a:avLst/>
-          </a:prstGeom>
-          <a:noFill/>
-        </p:spPr>
-        <p:txBody>
-          <a:bodyPr wrap="square">
-            <a:spAutoFit/>
-          </a:bodyPr>
-          <a:lstStyle/>
-          <a:p>
-            <a:pPr algn="ctr">
-              <a:defRPr sz="1200" b="0">
-                <a:solidFill>
-                  <a:srgbClr val="A0A0B0"/>
-                </a:solidFill>
-                <a:latin typeface="Segoe UI"/>
-              </a:defRPr>
-            </a:pPr>
-            <a:r>
-              <a:t>ドキュメント</a:t>
-            </a:r>
-            <a:br/>
-            <a:r>
-              <a:t>ストレージ</a:t>
-            </a:r>
-          </a:p>
-        </p:txBody>
-      </p:sp>
-      <p:sp>
-        <p:nvSpPr>
-          <p:cNvPr id="32" name="Rounded Rectangle 31"/>
-          <p:cNvSpPr/>
-          <p:nvPr/>
-        </p:nvSpPr>
-        <p:spPr>
-          <a:xfrm>
-            <a:off x="7315200" y="4389120"/>
-            <a:ext cx="2011680" cy="1371600"/>
-          </a:xfrm>
-          <a:prstGeom prst="roundRect">
-            <a:avLst/>
-          </a:prstGeom>
-          <a:solidFill>
-            <a:srgbClr val="1E293B"/>
-          </a:solidFill>
-          <a:ln>
-            <a:noFill/>
-          </a:ln>
-        </p:spPr>
-        <p:style>
-          <a:lnRef idx="1">
-            <a:schemeClr val="accent1"/>
-          </a:lnRef>
-          <a:fillRef idx="3">
-            <a:schemeClr val="accent1"/>
-          </a:fillRef>
-          <a:effectRef idx="2">
-            <a:schemeClr val="accent1"/>
-          </a:effectRef>
-          <a:fontRef idx="minor">
-            <a:schemeClr val="lt1"/>
-          </a:fontRef>
-        </p:style>
-        <p:txBody>
-          <a:bodyPr rtlCol="0" anchor="ctr"/>
-          <a:lstStyle/>
-          <a:p>
-            <a:pPr algn="ctr"/>
-          </a:p>
-        </p:txBody>
-      </p:sp>
-      <p:sp>
-        <p:nvSpPr>
-          <p:cNvPr id="33" name="TextBox 32"/>
-          <p:cNvSpPr txBox="1"/>
-          <p:nvPr/>
-        </p:nvSpPr>
-        <p:spPr>
-          <a:xfrm>
-            <a:off x="7452360" y="4526280"/>
-            <a:ext cx="1737360" cy="365760"/>
-          </a:xfrm>
-          <a:prstGeom prst="rect">
-            <a:avLst/>
-          </a:prstGeom>
-          <a:noFill/>
-        </p:spPr>
-        <p:txBody>
-          <a:bodyPr wrap="square">
-            <a:spAutoFit/>
-          </a:bodyPr>
-          <a:lstStyle/>
-          <a:p>
-            <a:pPr algn="ctr">
-              <a:defRPr sz="1500" b="1">
-                <a:solidFill>
-                  <a:srgbClr val="38BDF8"/>
-                </a:solidFill>
-                <a:latin typeface="Segoe UI"/>
-              </a:defRPr>
-            </a:pPr>
-            <a:r>
-              <a:t>Eventarc</a:t>
-            </a:r>
-          </a:p>
-        </p:txBody>
-      </p:sp>
-      <p:sp>
-        <p:nvSpPr>
-          <p:cNvPr id="34" name="TextBox 33"/>
-          <p:cNvSpPr txBox="1"/>
-          <p:nvPr/>
-        </p:nvSpPr>
-        <p:spPr>
-          <a:xfrm>
-            <a:off x="7452360" y="4937760"/>
-            <a:ext cx="1737360" cy="731520"/>
-          </a:xfrm>
-          <a:prstGeom prst="rect">
-            <a:avLst/>
-          </a:prstGeom>
-          <a:noFill/>
-        </p:spPr>
-        <p:txBody>
-          <a:bodyPr wrap="square">
-            <a:spAutoFit/>
-          </a:bodyPr>
-          <a:lstStyle/>
-          <a:p>
-            <a:pPr algn="ctr">
-              <a:defRPr sz="1200" b="0">
-                <a:solidFill>
-                  <a:srgbClr val="A0A0B0"/>
-                </a:solidFill>
-                <a:latin typeface="Segoe UI"/>
-              </a:defRPr>
-            </a:pPr>
-            <a:r>
-              <a:t>イベント</a:t>
-            </a:r>
-            <a:br/>
-            <a:r>
-              <a:t>トリガー</a:t>
-            </a:r>
-          </a:p>
-        </p:txBody>
-      </p:sp>
-      <p:sp>
-        <p:nvSpPr>
-          <p:cNvPr id="35" name="Rounded Rectangle 34"/>
-          <p:cNvSpPr/>
-          <p:nvPr/>
-        </p:nvSpPr>
-        <p:spPr>
-          <a:xfrm>
-            <a:off x="9601200" y="4389120"/>
-            <a:ext cx="2011680" cy="1371600"/>
-          </a:xfrm>
-          <a:prstGeom prst="roundRect">
-            <a:avLst/>
-          </a:prstGeom>
-          <a:solidFill>
-            <a:srgbClr val="1E293B"/>
-          </a:solidFill>
-          <a:ln>
-            <a:noFill/>
-          </a:ln>
-        </p:spPr>
-        <p:style>
-          <a:lnRef idx="1">
-            <a:schemeClr val="accent1"/>
-          </a:lnRef>
-          <a:fillRef idx="3">
-            <a:schemeClr val="accent1"/>
-          </a:fillRef>
-          <a:effectRef idx="2">
-            <a:schemeClr val="accent1"/>
-          </a:effectRef>
-          <a:fontRef idx="minor">
-            <a:schemeClr val="lt1"/>
-          </a:fontRef>
-        </p:style>
-        <p:txBody>
-          <a:bodyPr rtlCol="0" anchor="ctr"/>
-          <a:lstStyle/>
-          <a:p>
-            <a:pPr algn="ctr"/>
-          </a:p>
-        </p:txBody>
-      </p:sp>
-      <p:sp>
-        <p:nvSpPr>
-          <p:cNvPr id="36" name="TextBox 35"/>
-          <p:cNvSpPr txBox="1"/>
-          <p:nvPr/>
-        </p:nvSpPr>
-        <p:spPr>
-          <a:xfrm>
-            <a:off x="9738360" y="4526280"/>
-            <a:ext cx="1737360" cy="365760"/>
-          </a:xfrm>
-          <a:prstGeom prst="rect">
-            <a:avLst/>
-          </a:prstGeom>
-          <a:noFill/>
-        </p:spPr>
-        <p:txBody>
-          <a:bodyPr wrap="square">
-            <a:spAutoFit/>
-          </a:bodyPr>
-          <a:lstStyle/>
-          <a:p>
-            <a:pPr algn="ctr">
-              <a:defRPr sz="1500" b="1">
-                <a:solidFill>
-                  <a:srgbClr val="38BDF8"/>
-                </a:solidFill>
-                <a:latin typeface="Segoe UI"/>
-              </a:defRPr>
-            </a:pPr>
-            <a:r>
-              <a:t>Pub/Sub</a:t>
-            </a:r>
-          </a:p>
-        </p:txBody>
-      </p:sp>
-      <p:sp>
-        <p:nvSpPr>
-          <p:cNvPr id="37" name="TextBox 36"/>
-          <p:cNvSpPr txBox="1"/>
-          <p:nvPr/>
-        </p:nvSpPr>
-        <p:spPr>
-          <a:xfrm>
-            <a:off x="9738360" y="4937760"/>
-            <a:ext cx="1737360" cy="731520"/>
-          </a:xfrm>
-          <a:prstGeom prst="rect">
-            <a:avLst/>
-          </a:prstGeom>
-          <a:noFill/>
-        </p:spPr>
-        <p:txBody>
-          <a:bodyPr wrap="square">
-            <a:spAutoFit/>
-          </a:bodyPr>
-          <a:lstStyle/>
-          <a:p>
-            <a:pPr algn="ctr">
-              <a:defRPr sz="1200" b="0">
-                <a:solidFill>
-                  <a:srgbClr val="A0A0B0"/>
-                </a:solidFill>
-                <a:latin typeface="Segoe UI"/>
-              </a:defRPr>
-            </a:pPr>
-            <a:r>
-              <a:t>リアルタイム</a:t>
-            </a:r>
-            <a:br/>
-            <a:r>
-              <a:t>通知</a:t>
-            </a:r>
-          </a:p>
-        </p:txBody>
-      </p:sp>
-      <p:sp>
-        <p:nvSpPr>
-          <p:cNvPr id="38" name="Rounded Rectangle 37"/>
-          <p:cNvSpPr/>
-          <p:nvPr/>
-        </p:nvSpPr>
-        <p:spPr>
-          <a:xfrm>
-            <a:off x="457200" y="5943600"/>
-            <a:ext cx="11247120" cy="640080"/>
-          </a:xfrm>
-          <a:prstGeom prst="roundRect">
-            <a:avLst/>
-          </a:prstGeom>
-          <a:solidFill>
-            <a:srgbClr val="34D399"/>
-          </a:solidFill>
-          <a:ln>
-            <a:noFill/>
-          </a:ln>
-        </p:spPr>
-        <p:style>
-          <a:lnRef idx="1">
-            <a:schemeClr val="accent1"/>
-          </a:lnRef>
-          <a:fillRef idx="3">
-            <a:schemeClr val="accent1"/>
-          </a:fillRef>
-          <a:effectRef idx="2">
-            <a:schemeClr val="accent1"/>
-          </a:effectRef>
-          <a:fontRef idx="minor">
-            <a:schemeClr val="lt1"/>
-          </a:fontRef>
-        </p:style>
-        <p:txBody>
-          <a:bodyPr rtlCol="0" anchor="ctr"/>
-          <a:lstStyle/>
-          <a:p>
-            <a:pPr algn="ctr"/>
-          </a:p>
-        </p:txBody>
-      </p:sp>
-      <p:sp>
-        <p:nvSpPr>
-          <p:cNvPr id="39" name="TextBox 38"/>
-          <p:cNvSpPr txBox="1"/>
-          <p:nvPr/>
-        </p:nvSpPr>
-        <p:spPr>
-          <a:xfrm>
-            <a:off x="731520" y="5989320"/>
-            <a:ext cx="10789920" cy="548640"/>
-          </a:xfrm>
-          <a:prstGeom prst="rect">
-            <a:avLst/>
-          </a:prstGeom>
-          <a:noFill/>
-        </p:spPr>
-        <p:txBody>
-          <a:bodyPr wrap="square">
-            <a:spAutoFit/>
-          </a:bodyPr>
-          <a:lstStyle/>
-          <a:p>
-            <a:pPr algn="ctr">
-              <a:defRPr sz="1600" b="1">
-                <a:solidFill>
-                  <a:srgbClr val="0F172A"/>
-                </a:solidFill>
-                <a:latin typeface="Segoe UI"/>
-              </a:defRPr>
-            </a:pPr>
-            <a:r>
-              <a:t>💡 差別化: テキスト意味矛盾 + 画像劣化のマルチモーダル検出 — LangGraphエージェントが自律実行</a:t>
-            </a:r>
-          </a:p>
-        </p:txBody>
-      </p:sp>
+      <p:pic>
+        <p:nvPicPr>
+          <p:cNvPr id="5" name="Picture 4" descr="architecture_runtime.png"/>
+          <p:cNvPicPr>
+            <a:picLocks noChangeAspect="1"/>
+          </p:cNvPicPr>
+          <p:nvPr/>
+        </p:nvPicPr>
+        <p:blipFill>
+          <a:blip r:embed="rId2"/>
+          <a:stretch>
+            <a:fillRect/>
+          </a:stretch>
+        </p:blipFill>
+        <p:spPr>
+          <a:xfrm>
+            <a:off x="731520" y="1554480"/>
+            <a:ext cx="10698480" cy="4846320"/>
+          </a:xfrm>
+          <a:prstGeom prst="rect">
+            <a:avLst/>
+          </a:prstGeom>
+        </p:spPr>
+      </p:pic>
     </p:spTree>
   </p:cSld>
   <p:clrMapOvr>
@@ -5431,7 +4087,7 @@
         </p:nvSpPr>
         <p:spPr>
           <a:xfrm>
-            <a:off x="731520" y="457200"/>
+            <a:off x="731520" y="274320"/>
             <a:ext cx="9144000" cy="731520"/>
           </a:xfrm>
           <a:prstGeom prst="rect">
@@ -5454,21 +4110,124 @@
               </a:defRPr>
             </a:pPr>
             <a:r>
-              <a:t>📈 ビジネス価値 &amp; 導入効果</a:t>
-            </a:r>
-          </a:p>
-        </p:txBody>
-      </p:sp>
-      <p:sp>
-        <p:nvSpPr>
-          <p:cNvPr id="3" name="Rounded Rectangle 2"/>
+              <a:t>Development with Google AntiGravity</a:t>
+            </a:r>
+          </a:p>
+        </p:txBody>
+      </p:sp>
+      <p:sp>
+        <p:nvSpPr>
+          <p:cNvPr id="3" name="TextBox 2"/>
+          <p:cNvSpPr txBox="1"/>
+          <p:nvPr/>
+        </p:nvSpPr>
+        <p:spPr>
+          <a:xfrm>
+            <a:off x="731520" y="914400"/>
+            <a:ext cx="10058400" cy="365760"/>
+          </a:xfrm>
+          <a:prstGeom prst="rect">
+            <a:avLst/>
+          </a:prstGeom>
+          <a:noFill/>
+        </p:spPr>
+        <p:txBody>
+          <a:bodyPr wrap="square">
+            <a:spAutoFit/>
+          </a:bodyPr>
+          <a:lstStyle/>
+          <a:p>
+            <a:pPr algn="l">
+              <a:defRPr sz="1600" b="0">
+                <a:solidFill>
+                  <a:srgbClr val="34D399"/>
+                </a:solidFill>
+                <a:latin typeface="Segoe UI"/>
+              </a:defRPr>
+            </a:pPr>
+            <a:r>
+              <a:t>AI-Assisted Coding for Rapid Prototyping &amp; Production</a:t>
+            </a:r>
+          </a:p>
+        </p:txBody>
+      </p:sp>
+      <p:sp>
+        <p:nvSpPr>
+          <p:cNvPr id="4" name="Rounded Rectangle 3"/>
           <p:cNvSpPr/>
           <p:nvPr/>
         </p:nvSpPr>
         <p:spPr>
           <a:xfrm>
-            <a:off x="731520" y="1645920"/>
-            <a:ext cx="3200400" cy="2743200"/>
+            <a:off x="274320" y="1371600"/>
+            <a:ext cx="7315200" cy="5212080"/>
+          </a:xfrm>
+          <a:prstGeom prst="roundRect">
+            <a:avLst/>
+          </a:prstGeom>
+          <a:solidFill>
+            <a:srgbClr val="FFFFFF"/>
+          </a:solidFill>
+          <a:ln>
+            <a:noFill/>
+          </a:ln>
+        </p:spPr>
+        <p:style>
+          <a:lnRef idx="1">
+            <a:schemeClr val="accent1"/>
+          </a:lnRef>
+          <a:fillRef idx="3">
+            <a:schemeClr val="accent1"/>
+          </a:fillRef>
+          <a:effectRef idx="2">
+            <a:schemeClr val="accent1"/>
+          </a:effectRef>
+          <a:fontRef idx="minor">
+            <a:schemeClr val="lt1"/>
+          </a:fontRef>
+        </p:style>
+        <p:txBody>
+          <a:bodyPr rtlCol="0" anchor="ctr"/>
+          <a:lstStyle/>
+          <a:p>
+            <a:pPr algn="ctr"/>
+          </a:p>
+        </p:txBody>
+      </p:sp>
+      <p:pic>
+        <p:nvPicPr>
+          <p:cNvPr id="5" name="Picture 4" descr="architecture_development.png"/>
+          <p:cNvPicPr>
+            <a:picLocks noChangeAspect="1"/>
+          </p:cNvPicPr>
+          <p:nvPr/>
+        </p:nvPicPr>
+        <p:blipFill>
+          <a:blip r:embed="rId2"/>
+          <a:stretch>
+            <a:fillRect/>
+          </a:stretch>
+        </p:blipFill>
+        <p:spPr>
+          <a:xfrm>
+            <a:off x="457200" y="1554480"/>
+            <a:ext cx="6858000" cy="4846320"/>
+          </a:xfrm>
+          <a:prstGeom prst="rect">
+            <a:avLst/>
+          </a:prstGeom>
+        </p:spPr>
+      </p:pic>
+      <p:sp>
+        <p:nvSpPr>
+          <p:cNvPr id="6" name="Rounded Rectangle 5"/>
+          <p:cNvSpPr/>
+          <p:nvPr/>
+        </p:nvSpPr>
+        <p:spPr>
+          <a:xfrm>
+            <a:off x="8046720" y="1371600"/>
+            <a:ext cx="3840480" cy="868680"/>
           </a:xfrm>
           <a:prstGeom prst="roundRect">
             <a:avLst/>
@@ -5504,14 +4263,14 @@
       </p:sp>
       <p:sp>
         <p:nvSpPr>
-          <p:cNvPr id="4" name="TextBox 3"/>
+          <p:cNvPr id="7" name="TextBox 6"/>
           <p:cNvSpPr txBox="1"/>
           <p:nvPr/>
         </p:nvSpPr>
         <p:spPr>
           <a:xfrm>
-            <a:off x="1005840" y="1920240"/>
-            <a:ext cx="2743200" cy="914400"/>
+            <a:off x="8229600" y="1417320"/>
+            <a:ext cx="3474720" cy="320040"/>
           </a:xfrm>
           <a:prstGeom prst="rect">
             <a:avLst/>
@@ -5524,30 +4283,30 @@
           </a:bodyPr>
           <a:lstStyle/>
           <a:p>
-            <a:pPr algn="ctr">
-              <a:defRPr sz="5200" b="1">
-                <a:solidFill>
-                  <a:srgbClr val="34D399"/>
+            <a:pPr algn="l">
+              <a:defRPr sz="1300" b="1">
+                <a:solidFill>
+                  <a:srgbClr val="38BDF8"/>
                 </a:solidFill>
                 <a:latin typeface="Segoe UI"/>
               </a:defRPr>
             </a:pPr>
             <a:r>
-              <a:t>95%</a:t>
-            </a:r>
-          </a:p>
-        </p:txBody>
-      </p:sp>
-      <p:sp>
-        <p:nvSpPr>
-          <p:cNvPr id="5" name="TextBox 4"/>
+              <a:t>AI-Assisted Coding</a:t>
+            </a:r>
+          </a:p>
+        </p:txBody>
+      </p:sp>
+      <p:sp>
+        <p:nvSpPr>
+          <p:cNvPr id="8" name="TextBox 7"/>
           <p:cNvSpPr txBox="1"/>
           <p:nvPr/>
         </p:nvSpPr>
         <p:spPr>
           <a:xfrm>
-            <a:off x="1005840" y="2834640"/>
-            <a:ext cx="2743200" cy="457200"/>
+            <a:off x="8229600" y="1737360"/>
+            <a:ext cx="3474720" cy="457200"/>
           </a:xfrm>
           <a:prstGeom prst="rect">
             <a:avLst/>
@@ -5560,70 +4319,34 @@
           </a:bodyPr>
           <a:lstStyle/>
           <a:p>
-            <a:pPr algn="ctr">
-              <a:defRPr sz="2200" b="0">
-                <a:solidFill>
-                  <a:srgbClr val="34D399"/>
+            <a:pPr algn="l">
+              <a:defRPr sz="1100" b="0">
+                <a:solidFill>
+                  <a:srgbClr val="A0A0B0"/>
                 </a:solidFill>
                 <a:latin typeface="Segoe UI"/>
               </a:defRPr>
             </a:pPr>
             <a:r>
-              <a:t>削減</a:t>
-            </a:r>
-          </a:p>
-        </p:txBody>
-      </p:sp>
-      <p:sp>
-        <p:nvSpPr>
-          <p:cNvPr id="6" name="TextBox 5"/>
-          <p:cNvSpPr txBox="1"/>
-          <p:nvPr/>
-        </p:nvSpPr>
-        <p:spPr>
-          <a:xfrm>
-            <a:off x="1005840" y="3383280"/>
-            <a:ext cx="2743200" cy="914400"/>
-          </a:xfrm>
-          <a:prstGeom prst="rect">
-            <a:avLst/>
-          </a:prstGeom>
-          <a:noFill/>
-        </p:spPr>
-        <p:txBody>
-          <a:bodyPr wrap="square">
-            <a:spAutoFit/>
-          </a:bodyPr>
-          <a:lstStyle/>
-          <a:p>
-            <a:pPr algn="ctr">
-              <a:defRPr sz="1500" b="0">
-                <a:solidFill>
-                  <a:srgbClr val="A0A0B0"/>
-                </a:solidFill>
-                <a:latin typeface="Segoe UI"/>
-              </a:defRPr>
-            </a:pPr>
-            <a:r>
-              <a:t>ドキュメント矛盾</a:t>
+              <a:t>AntiGravityがアーキテクチャ設計</a:t>
             </a:r>
             <a:br/>
             <a:r>
-              <a:t>検出時間</a:t>
-            </a:r>
-          </a:p>
-        </p:txBody>
-      </p:sp>
-      <p:sp>
-        <p:nvSpPr>
-          <p:cNvPr id="7" name="Rounded Rectangle 6"/>
+              <a:t>から実装まで支援</a:t>
+            </a:r>
+          </a:p>
+        </p:txBody>
+      </p:sp>
+      <p:sp>
+        <p:nvSpPr>
+          <p:cNvPr id="9" name="Rounded Rectangle 8"/>
           <p:cNvSpPr/>
           <p:nvPr/>
         </p:nvSpPr>
         <p:spPr>
           <a:xfrm>
-            <a:off x="4389120" y="1645920"/>
-            <a:ext cx="3200400" cy="2743200"/>
+            <a:off x="8046720" y="2377440"/>
+            <a:ext cx="3840480" cy="868680"/>
           </a:xfrm>
           <a:prstGeom prst="roundRect">
             <a:avLst/>
@@ -5659,14 +4382,14 @@
       </p:sp>
       <p:sp>
         <p:nvSpPr>
-          <p:cNvPr id="8" name="TextBox 7"/>
+          <p:cNvPr id="10" name="TextBox 9"/>
           <p:cNvSpPr txBox="1"/>
           <p:nvPr/>
         </p:nvSpPr>
         <p:spPr>
           <a:xfrm>
-            <a:off x="4663440" y="1920240"/>
-            <a:ext cx="2743200" cy="914400"/>
+            <a:off x="8229600" y="2423160"/>
+            <a:ext cx="3474720" cy="320040"/>
           </a:xfrm>
           <a:prstGeom prst="rect">
             <a:avLst/>
@@ -5679,30 +4402,30 @@
           </a:bodyPr>
           <a:lstStyle/>
           <a:p>
-            <a:pPr algn="ctr">
-              <a:defRPr sz="5200" b="1">
-                <a:solidFill>
-                  <a:srgbClr val="FBBF24"/>
+            <a:pPr algn="l">
+              <a:defRPr sz="1300" b="1">
+                <a:solidFill>
+                  <a:srgbClr val="38BDF8"/>
                 </a:solidFill>
                 <a:latin typeface="Segoe UI"/>
               </a:defRPr>
             </a:pPr>
             <a:r>
-              <a:t>73%</a:t>
-            </a:r>
-          </a:p>
-        </p:txBody>
-      </p:sp>
-      <p:sp>
-        <p:nvSpPr>
-          <p:cNvPr id="9" name="TextBox 8"/>
+              <a:t>LangGraph Pipeline</a:t>
+            </a:r>
+          </a:p>
+        </p:txBody>
+      </p:sp>
+      <p:sp>
+        <p:nvSpPr>
+          <p:cNvPr id="11" name="TextBox 10"/>
           <p:cNvSpPr txBox="1"/>
           <p:nvPr/>
         </p:nvSpPr>
         <p:spPr>
           <a:xfrm>
-            <a:off x="4663440" y="2834640"/>
-            <a:ext cx="2743200" cy="457200"/>
+            <a:off x="8229600" y="2743200"/>
+            <a:ext cx="3474720" cy="457200"/>
           </a:xfrm>
           <a:prstGeom prst="rect">
             <a:avLst/>
@@ -5715,70 +4438,34 @@
           </a:bodyPr>
           <a:lstStyle/>
           <a:p>
-            <a:pPr algn="ctr">
-              <a:defRPr sz="2200" b="0">
-                <a:solidFill>
-                  <a:srgbClr val="FBBF24"/>
+            <a:pPr algn="l">
+              <a:defRPr sz="1100" b="0">
+                <a:solidFill>
+                  <a:srgbClr val="A0A0B0"/>
                 </a:solidFill>
                 <a:latin typeface="Segoe UI"/>
               </a:defRPr>
             </a:pPr>
             <a:r>
-              <a:t>減少</a:t>
-            </a:r>
-          </a:p>
-        </p:txBody>
-      </p:sp>
-      <p:sp>
-        <p:nvSpPr>
-          <p:cNvPr id="10" name="TextBox 9"/>
-          <p:cNvSpPr txBox="1"/>
-          <p:nvPr/>
-        </p:nvSpPr>
-        <p:spPr>
-          <a:xfrm>
-            <a:off x="4663440" y="3383280"/>
-            <a:ext cx="2743200" cy="914400"/>
-          </a:xfrm>
-          <a:prstGeom prst="rect">
-            <a:avLst/>
-          </a:prstGeom>
-          <a:noFill/>
-        </p:spPr>
-        <p:txBody>
-          <a:bodyPr wrap="square">
-            <a:spAutoFit/>
-          </a:bodyPr>
-          <a:lstStyle/>
-          <a:p>
-            <a:pPr algn="ctr">
-              <a:defRPr sz="1500" b="0">
-                <a:solidFill>
-                  <a:srgbClr val="A0A0B0"/>
-                </a:solidFill>
-                <a:latin typeface="Segoe UI"/>
-              </a:defRPr>
-            </a:pPr>
-            <a:r>
-              <a:t>古いドキュメントによる</a:t>
+              <a:t>エージェントパイプラインの</a:t>
             </a:r>
             <a:br/>
             <a:r>
-              <a:t>顧客問い合わせ</a:t>
-            </a:r>
-          </a:p>
-        </p:txBody>
-      </p:sp>
-      <p:sp>
-        <p:nvSpPr>
-          <p:cNvPr id="11" name="Rounded Rectangle 10"/>
+              <a:t>設計・実装を加速</a:t>
+            </a:r>
+          </a:p>
+        </p:txBody>
+      </p:sp>
+      <p:sp>
+        <p:nvSpPr>
+          <p:cNvPr id="12" name="Rounded Rectangle 11"/>
           <p:cNvSpPr/>
           <p:nvPr/>
         </p:nvSpPr>
         <p:spPr>
           <a:xfrm>
-            <a:off x="8046720" y="1645920"/>
-            <a:ext cx="3200400" cy="2743200"/>
+            <a:off x="8046720" y="3383280"/>
+            <a:ext cx="3840480" cy="868680"/>
           </a:xfrm>
           <a:prstGeom prst="roundRect">
             <a:avLst/>
@@ -5814,14 +4501,14 @@
       </p:sp>
       <p:sp>
         <p:nvSpPr>
-          <p:cNvPr id="12" name="TextBox 11"/>
+          <p:cNvPr id="13" name="TextBox 12"/>
           <p:cNvSpPr txBox="1"/>
           <p:nvPr/>
         </p:nvSpPr>
         <p:spPr>
           <a:xfrm>
-            <a:off x="8321040" y="1920240"/>
-            <a:ext cx="2743200" cy="914400"/>
+            <a:off x="8229600" y="3429000"/>
+            <a:ext cx="3474720" cy="320040"/>
           </a:xfrm>
           <a:prstGeom prst="rect">
             <a:avLst/>
@@ -5834,8 +4521,8 @@
           </a:bodyPr>
           <a:lstStyle/>
           <a:p>
-            <a:pPr algn="ctr">
-              <a:defRPr sz="5200" b="1">
+            <a:pPr algn="l">
+              <a:defRPr sz="1300" b="1">
                 <a:solidFill>
                   <a:srgbClr val="38BDF8"/>
                 </a:solidFill>
@@ -5843,21 +4530,21 @@
               </a:defRPr>
             </a:pPr>
             <a:r>
-              <a:t>65→95%</a:t>
-            </a:r>
-          </a:p>
-        </p:txBody>
-      </p:sp>
-      <p:sp>
-        <p:nvSpPr>
-          <p:cNvPr id="13" name="TextBox 12"/>
+              <a:t>Dashboard UI</a:t>
+            </a:r>
+          </a:p>
+        </p:txBody>
+      </p:sp>
+      <p:sp>
+        <p:nvSpPr>
+          <p:cNvPr id="14" name="TextBox 13"/>
           <p:cNvSpPr txBox="1"/>
           <p:nvPr/>
         </p:nvSpPr>
         <p:spPr>
           <a:xfrm>
-            <a:off x="8321040" y="2834640"/>
-            <a:ext cx="2743200" cy="457200"/>
+            <a:off x="8229600" y="3749040"/>
+            <a:ext cx="3474720" cy="457200"/>
           </a:xfrm>
           <a:prstGeom prst="rect">
             <a:avLst/>
@@ -5870,56 +4557,20 @@
           </a:bodyPr>
           <a:lstStyle/>
           <a:p>
-            <a:pPr algn="ctr">
-              <a:defRPr sz="2200" b="0">
-                <a:solidFill>
-                  <a:srgbClr val="38BDF8"/>
+            <a:pPr algn="l">
+              <a:defRPr sz="1100" b="0">
+                <a:solidFill>
+                  <a:srgbClr val="A0A0B0"/>
                 </a:solidFill>
                 <a:latin typeface="Segoe UI"/>
               </a:defRPr>
             </a:pPr>
             <a:r>
-              <a:t>向上</a:t>
-            </a:r>
-          </a:p>
-        </p:txBody>
-      </p:sp>
-      <p:sp>
-        <p:nvSpPr>
-          <p:cNvPr id="14" name="TextBox 13"/>
-          <p:cNvSpPr txBox="1"/>
-          <p:nvPr/>
-        </p:nvSpPr>
-        <p:spPr>
-          <a:xfrm>
-            <a:off x="8321040" y="3383280"/>
-            <a:ext cx="2743200" cy="914400"/>
-          </a:xfrm>
-          <a:prstGeom prst="rect">
-            <a:avLst/>
-          </a:prstGeom>
-          <a:noFill/>
-        </p:spPr>
-        <p:txBody>
-          <a:bodyPr wrap="square">
-            <a:spAutoFit/>
-          </a:bodyPr>
-          <a:lstStyle/>
-          <a:p>
-            <a:pPr algn="ctr">
-              <a:defRPr sz="1500" b="0">
-                <a:solidFill>
-                  <a:srgbClr val="A0A0B0"/>
-                </a:solidFill>
-                <a:latin typeface="Segoe UI"/>
-              </a:defRPr>
-            </a:pPr>
-            <a:r>
-              <a:t>ドキュメント</a:t>
+              <a:t>Streamlitダッシュボードの</a:t>
             </a:r>
             <a:br/>
             <a:r>
-              <a:t>品質スコア</a:t>
+              <a:t>UI/UX構築を支援</a:t>
             </a:r>
           </a:p>
         </p:txBody>
@@ -5932,8 +4583,8 @@
         </p:nvSpPr>
         <p:spPr>
           <a:xfrm>
-            <a:off x="731520" y="4754880"/>
-            <a:ext cx="10515600" cy="1645920"/>
+            <a:off x="8046720" y="4389120"/>
+            <a:ext cx="3840480" cy="868680"/>
           </a:xfrm>
           <a:prstGeom prst="roundRect">
             <a:avLst/>
@@ -5975,8 +4626,8 @@
         </p:nvSpPr>
         <p:spPr>
           <a:xfrm>
-            <a:off x="1097280" y="4937760"/>
-            <a:ext cx="4572000" cy="640080"/>
+            <a:off x="8229600" y="4434840"/>
+            <a:ext cx="3474720" cy="320040"/>
           </a:xfrm>
           <a:prstGeom prst="rect">
             <a:avLst/>
@@ -5990,15 +4641,15 @@
           <a:lstStyle/>
           <a:p>
             <a:pPr algn="l">
-              <a:defRPr sz="2200" b="1">
-                <a:solidFill>
-                  <a:srgbClr val="FFFFFF"/>
+              <a:defRPr sz="1300" b="1">
+                <a:solidFill>
+                  <a:srgbClr val="38BDF8"/>
                 </a:solidFill>
                 <a:latin typeface="Segoe UI"/>
               </a:defRPr>
             </a:pPr>
             <a:r>
-              <a:t>💰 年間コスト削減効果</a:t>
+              <a:t>Test Generation</a:t>
             </a:r>
           </a:p>
         </p:txBody>
@@ -6011,8 +4662,8 @@
         </p:nvSpPr>
         <p:spPr>
           <a:xfrm>
-            <a:off x="1097280" y="5486400"/>
-            <a:ext cx="4572000" cy="731520"/>
+            <a:off x="8229600" y="4754880"/>
+            <a:ext cx="3474720" cy="457200"/>
           </a:xfrm>
           <a:prstGeom prst="rect">
             <a:avLst/>
@@ -6026,7 +4677,7 @@
           <a:lstStyle/>
           <a:p>
             <a:pPr algn="l">
-              <a:defRPr sz="1800" b="0">
+              <a:defRPr sz="1100" b="0">
                 <a:solidFill>
                   <a:srgbClr val="A0A0B0"/>
                 </a:solidFill>
@@ -6034,21 +4685,68 @@
               </a:defRPr>
             </a:pPr>
             <a:r>
-              <a:t>50人規模の組織で</a:t>
-            </a:r>
-          </a:p>
-        </p:txBody>
-      </p:sp>
-      <p:sp>
-        <p:nvSpPr>
-          <p:cNvPr id="18" name="TextBox 17"/>
+              <a:t>ユニット&amp;E2Eテストの</a:t>
+            </a:r>
+            <a:br/>
+            <a:r>
+              <a:t>自動生成で品質確保</a:t>
+            </a:r>
+          </a:p>
+        </p:txBody>
+      </p:sp>
+      <p:sp>
+        <p:nvSpPr>
+          <p:cNvPr id="18" name="Rounded Rectangle 17"/>
+          <p:cNvSpPr/>
+          <p:nvPr/>
+        </p:nvSpPr>
+        <p:spPr>
+          <a:xfrm>
+            <a:off x="8046720" y="5394960"/>
+            <a:ext cx="3840480" cy="868680"/>
+          </a:xfrm>
+          <a:prstGeom prst="roundRect">
+            <a:avLst/>
+          </a:prstGeom>
+          <a:solidFill>
+            <a:srgbClr val="1E293B"/>
+          </a:solidFill>
+          <a:ln>
+            <a:noFill/>
+          </a:ln>
+        </p:spPr>
+        <p:style>
+          <a:lnRef idx="1">
+            <a:schemeClr val="accent1"/>
+          </a:lnRef>
+          <a:fillRef idx="3">
+            <a:schemeClr val="accent1"/>
+          </a:fillRef>
+          <a:effectRef idx="2">
+            <a:schemeClr val="accent1"/>
+          </a:effectRef>
+          <a:fontRef idx="minor">
+            <a:schemeClr val="lt1"/>
+          </a:fontRef>
+        </p:style>
+        <p:txBody>
+          <a:bodyPr rtlCol="0" anchor="ctr"/>
+          <a:lstStyle/>
+          <a:p>
+            <a:pPr algn="ctr"/>
+          </a:p>
+        </p:txBody>
+      </p:sp>
+      <p:sp>
+        <p:nvSpPr>
+          <p:cNvPr id="19" name="TextBox 18"/>
           <p:cNvSpPr txBox="1"/>
           <p:nvPr/>
         </p:nvSpPr>
         <p:spPr>
           <a:xfrm>
-            <a:off x="5943600" y="4846320"/>
-            <a:ext cx="4572000" cy="1371600"/>
+            <a:off x="8229600" y="5440680"/>
+            <a:ext cx="3474720" cy="320040"/>
           </a:xfrm>
           <a:prstGeom prst="rect">
             <a:avLst/>
@@ -6061,17 +4759,100 @@
           </a:bodyPr>
           <a:lstStyle/>
           <a:p>
-            <a:pPr algn="r">
-              <a:defRPr sz="5400" b="1">
-                <a:solidFill>
-                  <a:srgbClr val="34D399"/>
+            <a:pPr algn="l">
+              <a:defRPr sz="1300" b="1">
+                <a:solidFill>
+                  <a:srgbClr val="38BDF8"/>
                 </a:solidFill>
                 <a:latin typeface="Segoe UI"/>
               </a:defRPr>
             </a:pPr>
             <a:r>
-              <a:t>約480万円/年</a:t>
-            </a:r>
+              <a:t>CI/CD Pipeline</a:t>
+            </a:r>
+          </a:p>
+        </p:txBody>
+      </p:sp>
+      <p:sp>
+        <p:nvSpPr>
+          <p:cNvPr id="20" name="TextBox 19"/>
+          <p:cNvSpPr txBox="1"/>
+          <p:nvPr/>
+        </p:nvSpPr>
+        <p:spPr>
+          <a:xfrm>
+            <a:off x="8229600" y="5760720"/>
+            <a:ext cx="3474720" cy="457200"/>
+          </a:xfrm>
+          <a:prstGeom prst="rect">
+            <a:avLst/>
+          </a:prstGeom>
+          <a:noFill/>
+        </p:spPr>
+        <p:txBody>
+          <a:bodyPr wrap="square">
+            <a:spAutoFit/>
+          </a:bodyPr>
+          <a:lstStyle/>
+          <a:p>
+            <a:pPr algn="l">
+              <a:defRPr sz="1100" b="0">
+                <a:solidFill>
+                  <a:srgbClr val="A0A0B0"/>
+                </a:solidFill>
+                <a:latin typeface="Segoe UI"/>
+              </a:defRPr>
+            </a:pPr>
+            <a:r>
+              <a:t>GitHub Actions →</a:t>
+            </a:r>
+            <a:br/>
+            <a:r>
+              <a:t>Cloud Build → Cloud Run</a:t>
+            </a:r>
+          </a:p>
+        </p:txBody>
+      </p:sp>
+      <p:sp>
+        <p:nvSpPr>
+          <p:cNvPr id="21" name="Rounded Rectangle 20"/>
+          <p:cNvSpPr/>
+          <p:nvPr/>
+        </p:nvSpPr>
+        <p:spPr>
+          <a:xfrm>
+            <a:off x="274320" y="6492240"/>
+            <a:ext cx="11612880" cy="228600"/>
+          </a:xfrm>
+          <a:prstGeom prst="roundRect">
+            <a:avLst/>
+          </a:prstGeom>
+          <a:solidFill>
+            <a:srgbClr val="34D399"/>
+          </a:solidFill>
+          <a:ln>
+            <a:noFill/>
+          </a:ln>
+        </p:spPr>
+        <p:style>
+          <a:lnRef idx="1">
+            <a:schemeClr val="accent1"/>
+          </a:lnRef>
+          <a:fillRef idx="3">
+            <a:schemeClr val="accent1"/>
+          </a:fillRef>
+          <a:effectRef idx="2">
+            <a:schemeClr val="accent1"/>
+          </a:effectRef>
+          <a:fontRef idx="minor">
+            <a:schemeClr val="lt1"/>
+          </a:fontRef>
+        </p:style>
+        <p:txBody>
+          <a:bodyPr rtlCol="0" anchor="ctr"/>
+          <a:lstStyle/>
+          <a:p>
+            <a:pPr algn="ctr"/>
           </a:p>
         </p:txBody>
       </p:sp>
@@ -6084,6 +4865,2195 @@
 </file>
 
 <file path=ppt/slides/slide5.xml><?xml version="1.0" encoding="utf-8"?>
+<p:sld xmlns:a="http://schemas.openxmlformats.org/drawingml/2006/main" xmlns:p="http://schemas.openxmlformats.org/presentationml/2006/main" xmlns:r="http://schemas.openxmlformats.org/officeDocument/2006/relationships">
+  <p:cSld>
+    <p:bg>
+      <p:bgPr>
+        <a:solidFill>
+          <a:srgbClr val="0F172A"/>
+        </a:solidFill>
+        <a:effectLst/>
+      </p:bgPr>
+    </p:bg>
+    <p:spTree>
+      <p:nvGrpSpPr>
+        <p:cNvPr id="1" name=""/>
+        <p:cNvGrpSpPr/>
+        <p:nvPr/>
+      </p:nvGrpSpPr>
+      <p:grpSpPr/>
+      <p:sp>
+        <p:nvSpPr>
+          <p:cNvPr id="2" name="TextBox 1"/>
+          <p:cNvSpPr txBox="1"/>
+          <p:nvPr/>
+        </p:nvSpPr>
+        <p:spPr>
+          <a:xfrm>
+            <a:off x="731520" y="457200"/>
+            <a:ext cx="9144000" cy="731520"/>
+          </a:xfrm>
+          <a:prstGeom prst="rect">
+            <a:avLst/>
+          </a:prstGeom>
+          <a:noFill/>
+        </p:spPr>
+        <p:txBody>
+          <a:bodyPr wrap="square">
+            <a:spAutoFit/>
+          </a:bodyPr>
+          <a:lstStyle/>
+          <a:p>
+            <a:pPr algn="l">
+              <a:defRPr sz="3600" b="1">
+                <a:solidFill>
+                  <a:srgbClr val="FFFFFF"/>
+                </a:solidFill>
+                <a:latin typeface="Segoe UI"/>
+              </a:defRPr>
+            </a:pPr>
+            <a:r>
+              <a:t>🤖 アーキテクチャ &amp; コア技術</a:t>
+            </a:r>
+          </a:p>
+        </p:txBody>
+      </p:sp>
+      <p:sp>
+        <p:nvSpPr>
+          <p:cNvPr id="3" name="Rounded Rectangle 2"/>
+          <p:cNvSpPr/>
+          <p:nvPr/>
+        </p:nvSpPr>
+        <p:spPr>
+          <a:xfrm>
+            <a:off x="457200" y="1645920"/>
+            <a:ext cx="2011680" cy="1828800"/>
+          </a:xfrm>
+          <a:prstGeom prst="roundRect">
+            <a:avLst/>
+          </a:prstGeom>
+          <a:solidFill>
+            <a:srgbClr val="1E293B"/>
+          </a:solidFill>
+          <a:ln>
+            <a:noFill/>
+          </a:ln>
+        </p:spPr>
+        <p:style>
+          <a:lnRef idx="1">
+            <a:schemeClr val="accent1"/>
+          </a:lnRef>
+          <a:fillRef idx="3">
+            <a:schemeClr val="accent1"/>
+          </a:fillRef>
+          <a:effectRef idx="2">
+            <a:schemeClr val="accent1"/>
+          </a:effectRef>
+          <a:fontRef idx="minor">
+            <a:schemeClr val="lt1"/>
+          </a:fontRef>
+        </p:style>
+        <p:txBody>
+          <a:bodyPr rtlCol="0" anchor="ctr"/>
+          <a:lstStyle/>
+          <a:p>
+            <a:pPr algn="ctr"/>
+          </a:p>
+        </p:txBody>
+      </p:sp>
+      <p:sp>
+        <p:nvSpPr>
+          <p:cNvPr id="4" name="TextBox 3"/>
+          <p:cNvSpPr txBox="1"/>
+          <p:nvPr/>
+        </p:nvSpPr>
+        <p:spPr>
+          <a:xfrm>
+            <a:off x="594360" y="1828800"/>
+            <a:ext cx="1737360" cy="457200"/>
+          </a:xfrm>
+          <a:prstGeom prst="rect">
+            <a:avLst/>
+          </a:prstGeom>
+          <a:noFill/>
+        </p:spPr>
+        <p:txBody>
+          <a:bodyPr wrap="square">
+            <a:spAutoFit/>
+          </a:bodyPr>
+          <a:lstStyle/>
+          <a:p>
+            <a:pPr algn="ctr">
+              <a:defRPr sz="1600" b="1">
+                <a:solidFill>
+                  <a:srgbClr val="38BDF8"/>
+                </a:solidFill>
+                <a:latin typeface="Segoe UI"/>
+              </a:defRPr>
+            </a:pPr>
+            <a:r>
+              <a:t>1. 取得</a:t>
+            </a:r>
+          </a:p>
+        </p:txBody>
+      </p:sp>
+      <p:sp>
+        <p:nvSpPr>
+          <p:cNvPr id="5" name="TextBox 4"/>
+          <p:cNvSpPr txBox="1"/>
+          <p:nvPr/>
+        </p:nvSpPr>
+        <p:spPr>
+          <a:xfrm>
+            <a:off x="594360" y="2377440"/>
+            <a:ext cx="1737360" cy="914400"/>
+          </a:xfrm>
+          <a:prstGeom prst="rect">
+            <a:avLst/>
+          </a:prstGeom>
+          <a:noFill/>
+        </p:spPr>
+        <p:txBody>
+          <a:bodyPr wrap="square">
+            <a:spAutoFit/>
+          </a:bodyPr>
+          <a:lstStyle/>
+          <a:p>
+            <a:pPr algn="ctr">
+              <a:defRPr sz="1300" b="0">
+                <a:solidFill>
+                  <a:srgbClr val="A0A0B0"/>
+                </a:solidFill>
+                <a:latin typeface="Segoe UI"/>
+              </a:defRPr>
+            </a:pPr>
+            <a:r>
+              <a:t>Google Drive</a:t>
+            </a:r>
+            <a:br/>
+            <a:r>
+              <a:t>から文書取得</a:t>
+            </a:r>
+          </a:p>
+        </p:txBody>
+      </p:sp>
+      <p:sp>
+        <p:nvSpPr>
+          <p:cNvPr id="6" name="TextBox 5"/>
+          <p:cNvSpPr txBox="1"/>
+          <p:nvPr/>
+        </p:nvSpPr>
+        <p:spPr>
+          <a:xfrm>
+            <a:off x="2468880" y="2286000"/>
+            <a:ext cx="274320" cy="457200"/>
+          </a:xfrm>
+          <a:prstGeom prst="rect">
+            <a:avLst/>
+          </a:prstGeom>
+          <a:noFill/>
+        </p:spPr>
+        <p:txBody>
+          <a:bodyPr wrap="square">
+            <a:spAutoFit/>
+          </a:bodyPr>
+          <a:lstStyle/>
+          <a:p>
+            <a:pPr algn="ctr">
+              <a:defRPr sz="2400" b="0">
+                <a:solidFill>
+                  <a:srgbClr val="34D399"/>
+                </a:solidFill>
+                <a:latin typeface="Segoe UI"/>
+              </a:defRPr>
+            </a:pPr>
+            <a:r>
+              <a:t>→</a:t>
+            </a:r>
+          </a:p>
+        </p:txBody>
+      </p:sp>
+      <p:sp>
+        <p:nvSpPr>
+          <p:cNvPr id="7" name="Rounded Rectangle 6"/>
+          <p:cNvSpPr/>
+          <p:nvPr/>
+        </p:nvSpPr>
+        <p:spPr>
+          <a:xfrm>
+            <a:off x="2743200" y="1645920"/>
+            <a:ext cx="2011680" cy="1828800"/>
+          </a:xfrm>
+          <a:prstGeom prst="roundRect">
+            <a:avLst/>
+          </a:prstGeom>
+          <a:solidFill>
+            <a:srgbClr val="1E293B"/>
+          </a:solidFill>
+          <a:ln>
+            <a:noFill/>
+          </a:ln>
+        </p:spPr>
+        <p:style>
+          <a:lnRef idx="1">
+            <a:schemeClr val="accent1"/>
+          </a:lnRef>
+          <a:fillRef idx="3">
+            <a:schemeClr val="accent1"/>
+          </a:fillRef>
+          <a:effectRef idx="2">
+            <a:schemeClr val="accent1"/>
+          </a:effectRef>
+          <a:fontRef idx="minor">
+            <a:schemeClr val="lt1"/>
+          </a:fontRef>
+        </p:style>
+        <p:txBody>
+          <a:bodyPr rtlCol="0" anchor="ctr"/>
+          <a:lstStyle/>
+          <a:p>
+            <a:pPr algn="ctr"/>
+          </a:p>
+        </p:txBody>
+      </p:sp>
+      <p:sp>
+        <p:nvSpPr>
+          <p:cNvPr id="8" name="TextBox 7"/>
+          <p:cNvSpPr txBox="1"/>
+          <p:nvPr/>
+        </p:nvSpPr>
+        <p:spPr>
+          <a:xfrm>
+            <a:off x="2880360" y="1828800"/>
+            <a:ext cx="1737360" cy="457200"/>
+          </a:xfrm>
+          <a:prstGeom prst="rect">
+            <a:avLst/>
+          </a:prstGeom>
+          <a:noFill/>
+        </p:spPr>
+        <p:txBody>
+          <a:bodyPr wrap="square">
+            <a:spAutoFit/>
+          </a:bodyPr>
+          <a:lstStyle/>
+          <a:p>
+            <a:pPr algn="ctr">
+              <a:defRPr sz="1600" b="1">
+                <a:solidFill>
+                  <a:srgbClr val="38BDF8"/>
+                </a:solidFill>
+                <a:latin typeface="Segoe UI"/>
+              </a:defRPr>
+            </a:pPr>
+            <a:r>
+              <a:t>2. 検索</a:t>
+            </a:r>
+          </a:p>
+        </p:txBody>
+      </p:sp>
+      <p:sp>
+        <p:nvSpPr>
+          <p:cNvPr id="9" name="TextBox 8"/>
+          <p:cNvSpPr txBox="1"/>
+          <p:nvPr/>
+        </p:nvSpPr>
+        <p:spPr>
+          <a:xfrm>
+            <a:off x="2880360" y="2377440"/>
+            <a:ext cx="1737360" cy="914400"/>
+          </a:xfrm>
+          <a:prstGeom prst="rect">
+            <a:avLst/>
+          </a:prstGeom>
+          <a:noFill/>
+        </p:spPr>
+        <p:txBody>
+          <a:bodyPr wrap="square">
+            <a:spAutoFit/>
+          </a:bodyPr>
+          <a:lstStyle/>
+          <a:p>
+            <a:pPr algn="ctr">
+              <a:defRPr sz="1300" b="0">
+                <a:solidFill>
+                  <a:srgbClr val="A0A0B0"/>
+                </a:solidFill>
+                <a:latin typeface="Segoe UI"/>
+              </a:defRPr>
+            </a:pPr>
+            <a:r>
+              <a:t>Agent Builder</a:t>
+            </a:r>
+            <a:br/>
+            <a:r>
+              <a:t>で関連文書検索</a:t>
+            </a:r>
+          </a:p>
+        </p:txBody>
+      </p:sp>
+      <p:sp>
+        <p:nvSpPr>
+          <p:cNvPr id="10" name="TextBox 9"/>
+          <p:cNvSpPr txBox="1"/>
+          <p:nvPr/>
+        </p:nvSpPr>
+        <p:spPr>
+          <a:xfrm>
+            <a:off x="4754880" y="2286000"/>
+            <a:ext cx="274320" cy="457200"/>
+          </a:xfrm>
+          <a:prstGeom prst="rect">
+            <a:avLst/>
+          </a:prstGeom>
+          <a:noFill/>
+        </p:spPr>
+        <p:txBody>
+          <a:bodyPr wrap="square">
+            <a:spAutoFit/>
+          </a:bodyPr>
+          <a:lstStyle/>
+          <a:p>
+            <a:pPr algn="ctr">
+              <a:defRPr sz="2400" b="0">
+                <a:solidFill>
+                  <a:srgbClr val="34D399"/>
+                </a:solidFill>
+                <a:latin typeface="Segoe UI"/>
+              </a:defRPr>
+            </a:pPr>
+            <a:r>
+              <a:t>→</a:t>
+            </a:r>
+          </a:p>
+        </p:txBody>
+      </p:sp>
+      <p:sp>
+        <p:nvSpPr>
+          <p:cNvPr id="11" name="Rounded Rectangle 10"/>
+          <p:cNvSpPr/>
+          <p:nvPr/>
+        </p:nvSpPr>
+        <p:spPr>
+          <a:xfrm>
+            <a:off x="5029200" y="1645920"/>
+            <a:ext cx="2011680" cy="1828800"/>
+          </a:xfrm>
+          <a:prstGeom prst="roundRect">
+            <a:avLst/>
+          </a:prstGeom>
+          <a:solidFill>
+            <a:srgbClr val="1E293B"/>
+          </a:solidFill>
+          <a:ln>
+            <a:noFill/>
+          </a:ln>
+        </p:spPr>
+        <p:style>
+          <a:lnRef idx="1">
+            <a:schemeClr val="accent1"/>
+          </a:lnRef>
+          <a:fillRef idx="3">
+            <a:schemeClr val="accent1"/>
+          </a:fillRef>
+          <a:effectRef idx="2">
+            <a:schemeClr val="accent1"/>
+          </a:effectRef>
+          <a:fontRef idx="minor">
+            <a:schemeClr val="lt1"/>
+          </a:fontRef>
+        </p:style>
+        <p:txBody>
+          <a:bodyPr rtlCol="0" anchor="ctr"/>
+          <a:lstStyle/>
+          <a:p>
+            <a:pPr algn="ctr"/>
+          </a:p>
+        </p:txBody>
+      </p:sp>
+      <p:sp>
+        <p:nvSpPr>
+          <p:cNvPr id="12" name="TextBox 11"/>
+          <p:cNvSpPr txBox="1"/>
+          <p:nvPr/>
+        </p:nvSpPr>
+        <p:spPr>
+          <a:xfrm>
+            <a:off x="5166360" y="1828800"/>
+            <a:ext cx="1737360" cy="457200"/>
+          </a:xfrm>
+          <a:prstGeom prst="rect">
+            <a:avLst/>
+          </a:prstGeom>
+          <a:noFill/>
+        </p:spPr>
+        <p:txBody>
+          <a:bodyPr wrap="square">
+            <a:spAutoFit/>
+          </a:bodyPr>
+          <a:lstStyle/>
+          <a:p>
+            <a:pPr algn="ctr">
+              <a:defRPr sz="1600" b="1">
+                <a:solidFill>
+                  <a:srgbClr val="34D399"/>
+                </a:solidFill>
+                <a:latin typeface="Segoe UI"/>
+              </a:defRPr>
+            </a:pPr>
+            <a:r>
+              <a:t>3. 分析</a:t>
+            </a:r>
+          </a:p>
+        </p:txBody>
+      </p:sp>
+      <p:sp>
+        <p:nvSpPr>
+          <p:cNvPr id="13" name="TextBox 12"/>
+          <p:cNvSpPr txBox="1"/>
+          <p:nvPr/>
+        </p:nvSpPr>
+        <p:spPr>
+          <a:xfrm>
+            <a:off x="5166360" y="2377440"/>
+            <a:ext cx="1737360" cy="914400"/>
+          </a:xfrm>
+          <a:prstGeom prst="rect">
+            <a:avLst/>
+          </a:prstGeom>
+          <a:noFill/>
+        </p:spPr>
+        <p:txBody>
+          <a:bodyPr wrap="square">
+            <a:spAutoFit/>
+          </a:bodyPr>
+          <a:lstStyle/>
+          <a:p>
+            <a:pPr algn="ctr">
+              <a:defRPr sz="1300" b="0">
+                <a:solidFill>
+                  <a:srgbClr val="A0A0B0"/>
+                </a:solidFill>
+                <a:latin typeface="Segoe UI"/>
+              </a:defRPr>
+            </a:pPr>
+            <a:r>
+              <a:t>Gemini 2.0</a:t>
+            </a:r>
+            <a:br/>
+            <a:r>
+              <a:t>テキスト矛盾検出</a:t>
+            </a:r>
+          </a:p>
+        </p:txBody>
+      </p:sp>
+      <p:sp>
+        <p:nvSpPr>
+          <p:cNvPr id="14" name="TextBox 13"/>
+          <p:cNvSpPr txBox="1"/>
+          <p:nvPr/>
+        </p:nvSpPr>
+        <p:spPr>
+          <a:xfrm>
+            <a:off x="7040880" y="2286000"/>
+            <a:ext cx="274320" cy="457200"/>
+          </a:xfrm>
+          <a:prstGeom prst="rect">
+            <a:avLst/>
+          </a:prstGeom>
+          <a:noFill/>
+        </p:spPr>
+        <p:txBody>
+          <a:bodyPr wrap="square">
+            <a:spAutoFit/>
+          </a:bodyPr>
+          <a:lstStyle/>
+          <a:p>
+            <a:pPr algn="ctr">
+              <a:defRPr sz="2400" b="0">
+                <a:solidFill>
+                  <a:srgbClr val="34D399"/>
+                </a:solidFill>
+                <a:latin typeface="Segoe UI"/>
+              </a:defRPr>
+            </a:pPr>
+            <a:r>
+              <a:t>→</a:t>
+            </a:r>
+          </a:p>
+        </p:txBody>
+      </p:sp>
+      <p:sp>
+        <p:nvSpPr>
+          <p:cNvPr id="15" name="Rounded Rectangle 14"/>
+          <p:cNvSpPr/>
+          <p:nvPr/>
+        </p:nvSpPr>
+        <p:spPr>
+          <a:xfrm>
+            <a:off x="7315200" y="1645920"/>
+            <a:ext cx="2011680" cy="1828800"/>
+          </a:xfrm>
+          <a:prstGeom prst="roundRect">
+            <a:avLst/>
+          </a:prstGeom>
+          <a:solidFill>
+            <a:srgbClr val="1E293B"/>
+          </a:solidFill>
+          <a:ln>
+            <a:noFill/>
+          </a:ln>
+        </p:spPr>
+        <p:style>
+          <a:lnRef idx="1">
+            <a:schemeClr val="accent1"/>
+          </a:lnRef>
+          <a:fillRef idx="3">
+            <a:schemeClr val="accent1"/>
+          </a:fillRef>
+          <a:effectRef idx="2">
+            <a:schemeClr val="accent1"/>
+          </a:effectRef>
+          <a:fontRef idx="minor">
+            <a:schemeClr val="lt1"/>
+          </a:fontRef>
+        </p:style>
+        <p:txBody>
+          <a:bodyPr rtlCol="0" anchor="ctr"/>
+          <a:lstStyle/>
+          <a:p>
+            <a:pPr algn="ctr"/>
+          </a:p>
+        </p:txBody>
+      </p:sp>
+      <p:sp>
+        <p:nvSpPr>
+          <p:cNvPr id="16" name="TextBox 15"/>
+          <p:cNvSpPr txBox="1"/>
+          <p:nvPr/>
+        </p:nvSpPr>
+        <p:spPr>
+          <a:xfrm>
+            <a:off x="7452360" y="1828800"/>
+            <a:ext cx="1737360" cy="457200"/>
+          </a:xfrm>
+          <a:prstGeom prst="rect">
+            <a:avLst/>
+          </a:prstGeom>
+          <a:noFill/>
+        </p:spPr>
+        <p:txBody>
+          <a:bodyPr wrap="square">
+            <a:spAutoFit/>
+          </a:bodyPr>
+          <a:lstStyle/>
+          <a:p>
+            <a:pPr algn="ctr">
+              <a:defRPr sz="1600" b="1">
+                <a:solidFill>
+                  <a:srgbClr val="34D399"/>
+                </a:solidFill>
+                <a:latin typeface="Segoe UI"/>
+              </a:defRPr>
+            </a:pPr>
+            <a:r>
+              <a:t>4. 画像</a:t>
+            </a:r>
+          </a:p>
+        </p:txBody>
+      </p:sp>
+      <p:sp>
+        <p:nvSpPr>
+          <p:cNvPr id="17" name="TextBox 16"/>
+          <p:cNvSpPr txBox="1"/>
+          <p:nvPr/>
+        </p:nvSpPr>
+        <p:spPr>
+          <a:xfrm>
+            <a:off x="7452360" y="2377440"/>
+            <a:ext cx="1737360" cy="914400"/>
+          </a:xfrm>
+          <a:prstGeom prst="rect">
+            <a:avLst/>
+          </a:prstGeom>
+          <a:noFill/>
+        </p:spPr>
+        <p:txBody>
+          <a:bodyPr wrap="square">
+            <a:spAutoFit/>
+          </a:bodyPr>
+          <a:lstStyle/>
+          <a:p>
+            <a:pPr algn="ctr">
+              <a:defRPr sz="1300" b="0">
+                <a:solidFill>
+                  <a:srgbClr val="A0A0B0"/>
+                </a:solidFill>
+                <a:latin typeface="Segoe UI"/>
+              </a:defRPr>
+            </a:pPr>
+            <a:r>
+              <a:t>Gemini 2.0</a:t>
+            </a:r>
+            <a:br/>
+            <a:r>
+              <a:t>スクショ劣化検出</a:t>
+            </a:r>
+          </a:p>
+        </p:txBody>
+      </p:sp>
+      <p:sp>
+        <p:nvSpPr>
+          <p:cNvPr id="18" name="TextBox 17"/>
+          <p:cNvSpPr txBox="1"/>
+          <p:nvPr/>
+        </p:nvSpPr>
+        <p:spPr>
+          <a:xfrm>
+            <a:off x="9326880" y="2286000"/>
+            <a:ext cx="274320" cy="457200"/>
+          </a:xfrm>
+          <a:prstGeom prst="rect">
+            <a:avLst/>
+          </a:prstGeom>
+          <a:noFill/>
+        </p:spPr>
+        <p:txBody>
+          <a:bodyPr wrap="square">
+            <a:spAutoFit/>
+          </a:bodyPr>
+          <a:lstStyle/>
+          <a:p>
+            <a:pPr algn="ctr">
+              <a:defRPr sz="2400" b="0">
+                <a:solidFill>
+                  <a:srgbClr val="34D399"/>
+                </a:solidFill>
+                <a:latin typeface="Segoe UI"/>
+              </a:defRPr>
+            </a:pPr>
+            <a:r>
+              <a:t>→</a:t>
+            </a:r>
+          </a:p>
+        </p:txBody>
+      </p:sp>
+      <p:sp>
+        <p:nvSpPr>
+          <p:cNvPr id="19" name="Rounded Rectangle 18"/>
+          <p:cNvSpPr/>
+          <p:nvPr/>
+        </p:nvSpPr>
+        <p:spPr>
+          <a:xfrm>
+            <a:off x="9601200" y="1645920"/>
+            <a:ext cx="2011680" cy="1828800"/>
+          </a:xfrm>
+          <a:prstGeom prst="roundRect">
+            <a:avLst/>
+          </a:prstGeom>
+          <a:solidFill>
+            <a:srgbClr val="1E293B"/>
+          </a:solidFill>
+          <a:ln>
+            <a:noFill/>
+          </a:ln>
+        </p:spPr>
+        <p:style>
+          <a:lnRef idx="1">
+            <a:schemeClr val="accent1"/>
+          </a:lnRef>
+          <a:fillRef idx="3">
+            <a:schemeClr val="accent1"/>
+          </a:fillRef>
+          <a:effectRef idx="2">
+            <a:schemeClr val="accent1"/>
+          </a:effectRef>
+          <a:fontRef idx="minor">
+            <a:schemeClr val="lt1"/>
+          </a:fontRef>
+        </p:style>
+        <p:txBody>
+          <a:bodyPr rtlCol="0" anchor="ctr"/>
+          <a:lstStyle/>
+          <a:p>
+            <a:pPr algn="ctr"/>
+          </a:p>
+        </p:txBody>
+      </p:sp>
+      <p:sp>
+        <p:nvSpPr>
+          <p:cNvPr id="20" name="TextBox 19"/>
+          <p:cNvSpPr txBox="1"/>
+          <p:nvPr/>
+        </p:nvSpPr>
+        <p:spPr>
+          <a:xfrm>
+            <a:off x="9738360" y="1828800"/>
+            <a:ext cx="1737360" cy="457200"/>
+          </a:xfrm>
+          <a:prstGeom prst="rect">
+            <a:avLst/>
+          </a:prstGeom>
+          <a:noFill/>
+        </p:spPr>
+        <p:txBody>
+          <a:bodyPr wrap="square">
+            <a:spAutoFit/>
+          </a:bodyPr>
+          <a:lstStyle/>
+          <a:p>
+            <a:pPr algn="ctr">
+              <a:defRPr sz="1600" b="1">
+                <a:solidFill>
+                  <a:srgbClr val="38BDF8"/>
+                </a:solidFill>
+                <a:latin typeface="Segoe UI"/>
+              </a:defRPr>
+            </a:pPr>
+            <a:r>
+              <a:t>5. 提案</a:t>
+            </a:r>
+          </a:p>
+        </p:txBody>
+      </p:sp>
+      <p:sp>
+        <p:nvSpPr>
+          <p:cNvPr id="21" name="TextBox 20"/>
+          <p:cNvSpPr txBox="1"/>
+          <p:nvPr/>
+        </p:nvSpPr>
+        <p:spPr>
+          <a:xfrm>
+            <a:off x="9738360" y="2377440"/>
+            <a:ext cx="1737360" cy="914400"/>
+          </a:xfrm>
+          <a:prstGeom prst="rect">
+            <a:avLst/>
+          </a:prstGeom>
+          <a:noFill/>
+        </p:spPr>
+        <p:txBody>
+          <a:bodyPr wrap="square">
+            <a:spAutoFit/>
+          </a:bodyPr>
+          <a:lstStyle/>
+          <a:p>
+            <a:pPr algn="ctr">
+              <a:defRPr sz="1300" b="0">
+                <a:solidFill>
+                  <a:srgbClr val="A0A0B0"/>
+                </a:solidFill>
+                <a:latin typeface="Segoe UI"/>
+              </a:defRPr>
+            </a:pPr>
+            <a:r>
+              <a:t>修正提案</a:t>
+            </a:r>
+            <a:br/>
+            <a:r>
+              <a:t>自動生成</a:t>
+            </a:r>
+          </a:p>
+        </p:txBody>
+      </p:sp>
+      <p:sp>
+        <p:nvSpPr>
+          <p:cNvPr id="22" name="TextBox 21"/>
+          <p:cNvSpPr txBox="1"/>
+          <p:nvPr/>
+        </p:nvSpPr>
+        <p:spPr>
+          <a:xfrm>
+            <a:off x="731520" y="3840480"/>
+            <a:ext cx="4572000" cy="457200"/>
+          </a:xfrm>
+          <a:prstGeom prst="rect">
+            <a:avLst/>
+          </a:prstGeom>
+          <a:noFill/>
+        </p:spPr>
+        <p:txBody>
+          <a:bodyPr wrap="square">
+            <a:spAutoFit/>
+          </a:bodyPr>
+          <a:lstStyle/>
+          <a:p>
+            <a:pPr algn="l">
+              <a:defRPr sz="1800" b="1">
+                <a:solidFill>
+                  <a:srgbClr val="38BDF8"/>
+                </a:solidFill>
+                <a:latin typeface="Segoe UI"/>
+              </a:defRPr>
+            </a:pPr>
+            <a:r>
+              <a:t>☁️ Google Cloud サービス</a:t>
+            </a:r>
+          </a:p>
+        </p:txBody>
+      </p:sp>
+      <p:sp>
+        <p:nvSpPr>
+          <p:cNvPr id="23" name="Rounded Rectangle 22"/>
+          <p:cNvSpPr/>
+          <p:nvPr/>
+        </p:nvSpPr>
+        <p:spPr>
+          <a:xfrm>
+            <a:off x="457200" y="4389120"/>
+            <a:ext cx="2011680" cy="1371600"/>
+          </a:xfrm>
+          <a:prstGeom prst="roundRect">
+            <a:avLst/>
+          </a:prstGeom>
+          <a:solidFill>
+            <a:srgbClr val="1E293B"/>
+          </a:solidFill>
+          <a:ln>
+            <a:noFill/>
+          </a:ln>
+        </p:spPr>
+        <p:style>
+          <a:lnRef idx="1">
+            <a:schemeClr val="accent1"/>
+          </a:lnRef>
+          <a:fillRef idx="3">
+            <a:schemeClr val="accent1"/>
+          </a:fillRef>
+          <a:effectRef idx="2">
+            <a:schemeClr val="accent1"/>
+          </a:effectRef>
+          <a:fontRef idx="minor">
+            <a:schemeClr val="lt1"/>
+          </a:fontRef>
+        </p:style>
+        <p:txBody>
+          <a:bodyPr rtlCol="0" anchor="ctr"/>
+          <a:lstStyle/>
+          <a:p>
+            <a:pPr algn="ctr"/>
+          </a:p>
+        </p:txBody>
+      </p:sp>
+      <p:sp>
+        <p:nvSpPr>
+          <p:cNvPr id="24" name="TextBox 23"/>
+          <p:cNvSpPr txBox="1"/>
+          <p:nvPr/>
+        </p:nvSpPr>
+        <p:spPr>
+          <a:xfrm>
+            <a:off x="594360" y="4526280"/>
+            <a:ext cx="1737360" cy="365760"/>
+          </a:xfrm>
+          <a:prstGeom prst="rect">
+            <a:avLst/>
+          </a:prstGeom>
+          <a:noFill/>
+        </p:spPr>
+        <p:txBody>
+          <a:bodyPr wrap="square">
+            <a:spAutoFit/>
+          </a:bodyPr>
+          <a:lstStyle/>
+          <a:p>
+            <a:pPr algn="ctr">
+              <a:defRPr sz="1500" b="1">
+                <a:solidFill>
+                  <a:srgbClr val="38BDF8"/>
+                </a:solidFill>
+                <a:latin typeface="Segoe UI"/>
+              </a:defRPr>
+            </a:pPr>
+            <a:r>
+              <a:t>Cloud Run</a:t>
+            </a:r>
+          </a:p>
+        </p:txBody>
+      </p:sp>
+      <p:sp>
+        <p:nvSpPr>
+          <p:cNvPr id="25" name="TextBox 24"/>
+          <p:cNvSpPr txBox="1"/>
+          <p:nvPr/>
+        </p:nvSpPr>
+        <p:spPr>
+          <a:xfrm>
+            <a:off x="594360" y="4937760"/>
+            <a:ext cx="1737360" cy="731520"/>
+          </a:xfrm>
+          <a:prstGeom prst="rect">
+            <a:avLst/>
+          </a:prstGeom>
+          <a:noFill/>
+        </p:spPr>
+        <p:txBody>
+          <a:bodyPr wrap="square">
+            <a:spAutoFit/>
+          </a:bodyPr>
+          <a:lstStyle/>
+          <a:p>
+            <a:pPr algn="ctr">
+              <a:defRPr sz="1200" b="0">
+                <a:solidFill>
+                  <a:srgbClr val="A0A0B0"/>
+                </a:solidFill>
+                <a:latin typeface="Segoe UI"/>
+              </a:defRPr>
+            </a:pPr>
+            <a:r>
+              <a:t>サーバーレス</a:t>
+            </a:r>
+            <a:br/>
+            <a:r>
+              <a:t>ホスティング</a:t>
+            </a:r>
+          </a:p>
+        </p:txBody>
+      </p:sp>
+      <p:sp>
+        <p:nvSpPr>
+          <p:cNvPr id="26" name="Rounded Rectangle 25"/>
+          <p:cNvSpPr/>
+          <p:nvPr/>
+        </p:nvSpPr>
+        <p:spPr>
+          <a:xfrm>
+            <a:off x="2743200" y="4389120"/>
+            <a:ext cx="2011680" cy="1371600"/>
+          </a:xfrm>
+          <a:prstGeom prst="roundRect">
+            <a:avLst/>
+          </a:prstGeom>
+          <a:solidFill>
+            <a:srgbClr val="1E293B"/>
+          </a:solidFill>
+          <a:ln>
+            <a:noFill/>
+          </a:ln>
+        </p:spPr>
+        <p:style>
+          <a:lnRef idx="1">
+            <a:schemeClr val="accent1"/>
+          </a:lnRef>
+          <a:fillRef idx="3">
+            <a:schemeClr val="accent1"/>
+          </a:fillRef>
+          <a:effectRef idx="2">
+            <a:schemeClr val="accent1"/>
+          </a:effectRef>
+          <a:fontRef idx="minor">
+            <a:schemeClr val="lt1"/>
+          </a:fontRef>
+        </p:style>
+        <p:txBody>
+          <a:bodyPr rtlCol="0" anchor="ctr"/>
+          <a:lstStyle/>
+          <a:p>
+            <a:pPr algn="ctr"/>
+          </a:p>
+        </p:txBody>
+      </p:sp>
+      <p:sp>
+        <p:nvSpPr>
+          <p:cNvPr id="27" name="TextBox 26"/>
+          <p:cNvSpPr txBox="1"/>
+          <p:nvPr/>
+        </p:nvSpPr>
+        <p:spPr>
+          <a:xfrm>
+            <a:off x="2880360" y="4526280"/>
+            <a:ext cx="1737360" cy="365760"/>
+          </a:xfrm>
+          <a:prstGeom prst="rect">
+            <a:avLst/>
+          </a:prstGeom>
+          <a:noFill/>
+        </p:spPr>
+        <p:txBody>
+          <a:bodyPr wrap="square">
+            <a:spAutoFit/>
+          </a:bodyPr>
+          <a:lstStyle/>
+          <a:p>
+            <a:pPr algn="ctr">
+              <a:defRPr sz="1500" b="1">
+                <a:solidFill>
+                  <a:srgbClr val="38BDF8"/>
+                </a:solidFill>
+                <a:latin typeface="Segoe UI"/>
+              </a:defRPr>
+            </a:pPr>
+            <a:r>
+              <a:t>Firestore</a:t>
+            </a:r>
+          </a:p>
+        </p:txBody>
+      </p:sp>
+      <p:sp>
+        <p:nvSpPr>
+          <p:cNvPr id="28" name="TextBox 27"/>
+          <p:cNvSpPr txBox="1"/>
+          <p:nvPr/>
+        </p:nvSpPr>
+        <p:spPr>
+          <a:xfrm>
+            <a:off x="2880360" y="4937760"/>
+            <a:ext cx="1737360" cy="731520"/>
+          </a:xfrm>
+          <a:prstGeom prst="rect">
+            <a:avLst/>
+          </a:prstGeom>
+          <a:noFill/>
+        </p:spPr>
+        <p:txBody>
+          <a:bodyPr wrap="square">
+            <a:spAutoFit/>
+          </a:bodyPr>
+          <a:lstStyle/>
+          <a:p>
+            <a:pPr algn="ctr">
+              <a:defRPr sz="1200" b="0">
+                <a:solidFill>
+                  <a:srgbClr val="A0A0B0"/>
+                </a:solidFill>
+                <a:latin typeface="Segoe UI"/>
+              </a:defRPr>
+            </a:pPr>
+            <a:r>
+              <a:t>スキャン結果</a:t>
+            </a:r>
+            <a:br/>
+            <a:r>
+              <a:t>保存</a:t>
+            </a:r>
+          </a:p>
+        </p:txBody>
+      </p:sp>
+      <p:sp>
+        <p:nvSpPr>
+          <p:cNvPr id="29" name="Rounded Rectangle 28"/>
+          <p:cNvSpPr/>
+          <p:nvPr/>
+        </p:nvSpPr>
+        <p:spPr>
+          <a:xfrm>
+            <a:off x="5029200" y="4389120"/>
+            <a:ext cx="2011680" cy="1371600"/>
+          </a:xfrm>
+          <a:prstGeom prst="roundRect">
+            <a:avLst/>
+          </a:prstGeom>
+          <a:solidFill>
+            <a:srgbClr val="1E293B"/>
+          </a:solidFill>
+          <a:ln>
+            <a:noFill/>
+          </a:ln>
+        </p:spPr>
+        <p:style>
+          <a:lnRef idx="1">
+            <a:schemeClr val="accent1"/>
+          </a:lnRef>
+          <a:fillRef idx="3">
+            <a:schemeClr val="accent1"/>
+          </a:fillRef>
+          <a:effectRef idx="2">
+            <a:schemeClr val="accent1"/>
+          </a:effectRef>
+          <a:fontRef idx="minor">
+            <a:schemeClr val="lt1"/>
+          </a:fontRef>
+        </p:style>
+        <p:txBody>
+          <a:bodyPr rtlCol="0" anchor="ctr"/>
+          <a:lstStyle/>
+          <a:p>
+            <a:pPr algn="ctr"/>
+          </a:p>
+        </p:txBody>
+      </p:sp>
+      <p:sp>
+        <p:nvSpPr>
+          <p:cNvPr id="30" name="TextBox 29"/>
+          <p:cNvSpPr txBox="1"/>
+          <p:nvPr/>
+        </p:nvSpPr>
+        <p:spPr>
+          <a:xfrm>
+            <a:off x="5166360" y="4526280"/>
+            <a:ext cx="1737360" cy="365760"/>
+          </a:xfrm>
+          <a:prstGeom prst="rect">
+            <a:avLst/>
+          </a:prstGeom>
+          <a:noFill/>
+        </p:spPr>
+        <p:txBody>
+          <a:bodyPr wrap="square">
+            <a:spAutoFit/>
+          </a:bodyPr>
+          <a:lstStyle/>
+          <a:p>
+            <a:pPr algn="ctr">
+              <a:defRPr sz="1500" b="1">
+                <a:solidFill>
+                  <a:srgbClr val="38BDF8"/>
+                </a:solidFill>
+                <a:latin typeface="Segoe UI"/>
+              </a:defRPr>
+            </a:pPr>
+            <a:r>
+              <a:t>GCS</a:t>
+            </a:r>
+          </a:p>
+        </p:txBody>
+      </p:sp>
+      <p:sp>
+        <p:nvSpPr>
+          <p:cNvPr id="31" name="TextBox 30"/>
+          <p:cNvSpPr txBox="1"/>
+          <p:nvPr/>
+        </p:nvSpPr>
+        <p:spPr>
+          <a:xfrm>
+            <a:off x="5166360" y="4937760"/>
+            <a:ext cx="1737360" cy="731520"/>
+          </a:xfrm>
+          <a:prstGeom prst="rect">
+            <a:avLst/>
+          </a:prstGeom>
+          <a:noFill/>
+        </p:spPr>
+        <p:txBody>
+          <a:bodyPr wrap="square">
+            <a:spAutoFit/>
+          </a:bodyPr>
+          <a:lstStyle/>
+          <a:p>
+            <a:pPr algn="ctr">
+              <a:defRPr sz="1200" b="0">
+                <a:solidFill>
+                  <a:srgbClr val="A0A0B0"/>
+                </a:solidFill>
+                <a:latin typeface="Segoe UI"/>
+              </a:defRPr>
+            </a:pPr>
+            <a:r>
+              <a:t>ドキュメント</a:t>
+            </a:r>
+            <a:br/>
+            <a:r>
+              <a:t>ストレージ</a:t>
+            </a:r>
+          </a:p>
+        </p:txBody>
+      </p:sp>
+      <p:sp>
+        <p:nvSpPr>
+          <p:cNvPr id="32" name="Rounded Rectangle 31"/>
+          <p:cNvSpPr/>
+          <p:nvPr/>
+        </p:nvSpPr>
+        <p:spPr>
+          <a:xfrm>
+            <a:off x="7315200" y="4389120"/>
+            <a:ext cx="2011680" cy="1371600"/>
+          </a:xfrm>
+          <a:prstGeom prst="roundRect">
+            <a:avLst/>
+          </a:prstGeom>
+          <a:solidFill>
+            <a:srgbClr val="1E293B"/>
+          </a:solidFill>
+          <a:ln>
+            <a:noFill/>
+          </a:ln>
+        </p:spPr>
+        <p:style>
+          <a:lnRef idx="1">
+            <a:schemeClr val="accent1"/>
+          </a:lnRef>
+          <a:fillRef idx="3">
+            <a:schemeClr val="accent1"/>
+          </a:fillRef>
+          <a:effectRef idx="2">
+            <a:schemeClr val="accent1"/>
+          </a:effectRef>
+          <a:fontRef idx="minor">
+            <a:schemeClr val="lt1"/>
+          </a:fontRef>
+        </p:style>
+        <p:txBody>
+          <a:bodyPr rtlCol="0" anchor="ctr"/>
+          <a:lstStyle/>
+          <a:p>
+            <a:pPr algn="ctr"/>
+          </a:p>
+        </p:txBody>
+      </p:sp>
+      <p:sp>
+        <p:nvSpPr>
+          <p:cNvPr id="33" name="TextBox 32"/>
+          <p:cNvSpPr txBox="1"/>
+          <p:nvPr/>
+        </p:nvSpPr>
+        <p:spPr>
+          <a:xfrm>
+            <a:off x="7452360" y="4526280"/>
+            <a:ext cx="1737360" cy="365760"/>
+          </a:xfrm>
+          <a:prstGeom prst="rect">
+            <a:avLst/>
+          </a:prstGeom>
+          <a:noFill/>
+        </p:spPr>
+        <p:txBody>
+          <a:bodyPr wrap="square">
+            <a:spAutoFit/>
+          </a:bodyPr>
+          <a:lstStyle/>
+          <a:p>
+            <a:pPr algn="ctr">
+              <a:defRPr sz="1500" b="1">
+                <a:solidFill>
+                  <a:srgbClr val="38BDF8"/>
+                </a:solidFill>
+                <a:latin typeface="Segoe UI"/>
+              </a:defRPr>
+            </a:pPr>
+            <a:r>
+              <a:t>Eventarc</a:t>
+            </a:r>
+          </a:p>
+        </p:txBody>
+      </p:sp>
+      <p:sp>
+        <p:nvSpPr>
+          <p:cNvPr id="34" name="TextBox 33"/>
+          <p:cNvSpPr txBox="1"/>
+          <p:nvPr/>
+        </p:nvSpPr>
+        <p:spPr>
+          <a:xfrm>
+            <a:off x="7452360" y="4937760"/>
+            <a:ext cx="1737360" cy="731520"/>
+          </a:xfrm>
+          <a:prstGeom prst="rect">
+            <a:avLst/>
+          </a:prstGeom>
+          <a:noFill/>
+        </p:spPr>
+        <p:txBody>
+          <a:bodyPr wrap="square">
+            <a:spAutoFit/>
+          </a:bodyPr>
+          <a:lstStyle/>
+          <a:p>
+            <a:pPr algn="ctr">
+              <a:defRPr sz="1200" b="0">
+                <a:solidFill>
+                  <a:srgbClr val="A0A0B0"/>
+                </a:solidFill>
+                <a:latin typeface="Segoe UI"/>
+              </a:defRPr>
+            </a:pPr>
+            <a:r>
+              <a:t>イベント</a:t>
+            </a:r>
+            <a:br/>
+            <a:r>
+              <a:t>トリガー</a:t>
+            </a:r>
+          </a:p>
+        </p:txBody>
+      </p:sp>
+      <p:sp>
+        <p:nvSpPr>
+          <p:cNvPr id="35" name="Rounded Rectangle 34"/>
+          <p:cNvSpPr/>
+          <p:nvPr/>
+        </p:nvSpPr>
+        <p:spPr>
+          <a:xfrm>
+            <a:off x="9601200" y="4389120"/>
+            <a:ext cx="2011680" cy="1371600"/>
+          </a:xfrm>
+          <a:prstGeom prst="roundRect">
+            <a:avLst/>
+          </a:prstGeom>
+          <a:solidFill>
+            <a:srgbClr val="1E293B"/>
+          </a:solidFill>
+          <a:ln>
+            <a:noFill/>
+          </a:ln>
+        </p:spPr>
+        <p:style>
+          <a:lnRef idx="1">
+            <a:schemeClr val="accent1"/>
+          </a:lnRef>
+          <a:fillRef idx="3">
+            <a:schemeClr val="accent1"/>
+          </a:fillRef>
+          <a:effectRef idx="2">
+            <a:schemeClr val="accent1"/>
+          </a:effectRef>
+          <a:fontRef idx="minor">
+            <a:schemeClr val="lt1"/>
+          </a:fontRef>
+        </p:style>
+        <p:txBody>
+          <a:bodyPr rtlCol="0" anchor="ctr"/>
+          <a:lstStyle/>
+          <a:p>
+            <a:pPr algn="ctr"/>
+          </a:p>
+        </p:txBody>
+      </p:sp>
+      <p:sp>
+        <p:nvSpPr>
+          <p:cNvPr id="36" name="TextBox 35"/>
+          <p:cNvSpPr txBox="1"/>
+          <p:nvPr/>
+        </p:nvSpPr>
+        <p:spPr>
+          <a:xfrm>
+            <a:off x="9738360" y="4526280"/>
+            <a:ext cx="1737360" cy="365760"/>
+          </a:xfrm>
+          <a:prstGeom prst="rect">
+            <a:avLst/>
+          </a:prstGeom>
+          <a:noFill/>
+        </p:spPr>
+        <p:txBody>
+          <a:bodyPr wrap="square">
+            <a:spAutoFit/>
+          </a:bodyPr>
+          <a:lstStyle/>
+          <a:p>
+            <a:pPr algn="ctr">
+              <a:defRPr sz="1500" b="1">
+                <a:solidFill>
+                  <a:srgbClr val="38BDF8"/>
+                </a:solidFill>
+                <a:latin typeface="Segoe UI"/>
+              </a:defRPr>
+            </a:pPr>
+            <a:r>
+              <a:t>Pub/Sub</a:t>
+            </a:r>
+          </a:p>
+        </p:txBody>
+      </p:sp>
+      <p:sp>
+        <p:nvSpPr>
+          <p:cNvPr id="37" name="TextBox 36"/>
+          <p:cNvSpPr txBox="1"/>
+          <p:nvPr/>
+        </p:nvSpPr>
+        <p:spPr>
+          <a:xfrm>
+            <a:off x="9738360" y="4937760"/>
+            <a:ext cx="1737360" cy="731520"/>
+          </a:xfrm>
+          <a:prstGeom prst="rect">
+            <a:avLst/>
+          </a:prstGeom>
+          <a:noFill/>
+        </p:spPr>
+        <p:txBody>
+          <a:bodyPr wrap="square">
+            <a:spAutoFit/>
+          </a:bodyPr>
+          <a:lstStyle/>
+          <a:p>
+            <a:pPr algn="ctr">
+              <a:defRPr sz="1200" b="0">
+                <a:solidFill>
+                  <a:srgbClr val="A0A0B0"/>
+                </a:solidFill>
+                <a:latin typeface="Segoe UI"/>
+              </a:defRPr>
+            </a:pPr>
+            <a:r>
+              <a:t>リアルタイム</a:t>
+            </a:r>
+            <a:br/>
+            <a:r>
+              <a:t>通知</a:t>
+            </a:r>
+          </a:p>
+        </p:txBody>
+      </p:sp>
+      <p:sp>
+        <p:nvSpPr>
+          <p:cNvPr id="38" name="Rounded Rectangle 37"/>
+          <p:cNvSpPr/>
+          <p:nvPr/>
+        </p:nvSpPr>
+        <p:spPr>
+          <a:xfrm>
+            <a:off x="457200" y="5943600"/>
+            <a:ext cx="11247120" cy="640080"/>
+          </a:xfrm>
+          <a:prstGeom prst="roundRect">
+            <a:avLst/>
+          </a:prstGeom>
+          <a:solidFill>
+            <a:srgbClr val="34D399"/>
+          </a:solidFill>
+          <a:ln>
+            <a:noFill/>
+          </a:ln>
+        </p:spPr>
+        <p:style>
+          <a:lnRef idx="1">
+            <a:schemeClr val="accent1"/>
+          </a:lnRef>
+          <a:fillRef idx="3">
+            <a:schemeClr val="accent1"/>
+          </a:fillRef>
+          <a:effectRef idx="2">
+            <a:schemeClr val="accent1"/>
+          </a:effectRef>
+          <a:fontRef idx="minor">
+            <a:schemeClr val="lt1"/>
+          </a:fontRef>
+        </p:style>
+        <p:txBody>
+          <a:bodyPr rtlCol="0" anchor="ctr"/>
+          <a:lstStyle/>
+          <a:p>
+            <a:pPr algn="ctr"/>
+          </a:p>
+        </p:txBody>
+      </p:sp>
+      <p:sp>
+        <p:nvSpPr>
+          <p:cNvPr id="39" name="TextBox 38"/>
+          <p:cNvSpPr txBox="1"/>
+          <p:nvPr/>
+        </p:nvSpPr>
+        <p:spPr>
+          <a:xfrm>
+            <a:off x="731520" y="5989320"/>
+            <a:ext cx="10789920" cy="548640"/>
+          </a:xfrm>
+          <a:prstGeom prst="rect">
+            <a:avLst/>
+          </a:prstGeom>
+          <a:noFill/>
+        </p:spPr>
+        <p:txBody>
+          <a:bodyPr wrap="square">
+            <a:spAutoFit/>
+          </a:bodyPr>
+          <a:lstStyle/>
+          <a:p>
+            <a:pPr algn="ctr">
+              <a:defRPr sz="1600" b="1">
+                <a:solidFill>
+                  <a:srgbClr val="0F172A"/>
+                </a:solidFill>
+                <a:latin typeface="Segoe UI"/>
+              </a:defRPr>
+            </a:pPr>
+            <a:r>
+              <a:t>💡 差別化: テキスト意味矛盾 + 画像劣化のマルチモーダル検出 — LangGraphエージェントが自律実行</a:t>
+            </a:r>
+          </a:p>
+        </p:txBody>
+      </p:sp>
+    </p:spTree>
+  </p:cSld>
+  <p:clrMapOvr>
+    <a:masterClrMapping/>
+  </p:clrMapOvr>
+</p:sld>
+</file>
+
+<file path=ppt/slides/slide6.xml><?xml version="1.0" encoding="utf-8"?>
+<p:sld xmlns:a="http://schemas.openxmlformats.org/drawingml/2006/main" xmlns:p="http://schemas.openxmlformats.org/presentationml/2006/main" xmlns:r="http://schemas.openxmlformats.org/officeDocument/2006/relationships">
+  <p:cSld>
+    <p:bg>
+      <p:bgPr>
+        <a:solidFill>
+          <a:srgbClr val="0F172A"/>
+        </a:solidFill>
+        <a:effectLst/>
+      </p:bgPr>
+    </p:bg>
+    <p:spTree>
+      <p:nvGrpSpPr>
+        <p:cNvPr id="1" name=""/>
+        <p:cNvGrpSpPr/>
+        <p:nvPr/>
+      </p:nvGrpSpPr>
+      <p:grpSpPr/>
+      <p:sp>
+        <p:nvSpPr>
+          <p:cNvPr id="2" name="TextBox 1"/>
+          <p:cNvSpPr txBox="1"/>
+          <p:nvPr/>
+        </p:nvSpPr>
+        <p:spPr>
+          <a:xfrm>
+            <a:off x="731520" y="457200"/>
+            <a:ext cx="9144000" cy="731520"/>
+          </a:xfrm>
+          <a:prstGeom prst="rect">
+            <a:avLst/>
+          </a:prstGeom>
+          <a:noFill/>
+        </p:spPr>
+        <p:txBody>
+          <a:bodyPr wrap="square">
+            <a:spAutoFit/>
+          </a:bodyPr>
+          <a:lstStyle/>
+          <a:p>
+            <a:pPr algn="l">
+              <a:defRPr sz="3600" b="1">
+                <a:solidFill>
+                  <a:srgbClr val="FFFFFF"/>
+                </a:solidFill>
+                <a:latin typeface="Segoe UI"/>
+              </a:defRPr>
+            </a:pPr>
+            <a:r>
+              <a:t>📈 ビジネス価値 &amp; 導入効果</a:t>
+            </a:r>
+          </a:p>
+        </p:txBody>
+      </p:sp>
+      <p:sp>
+        <p:nvSpPr>
+          <p:cNvPr id="3" name="Rounded Rectangle 2"/>
+          <p:cNvSpPr/>
+          <p:nvPr/>
+        </p:nvSpPr>
+        <p:spPr>
+          <a:xfrm>
+            <a:off x="731520" y="1645920"/>
+            <a:ext cx="3200400" cy="2743200"/>
+          </a:xfrm>
+          <a:prstGeom prst="roundRect">
+            <a:avLst/>
+          </a:prstGeom>
+          <a:solidFill>
+            <a:srgbClr val="1E293B"/>
+          </a:solidFill>
+          <a:ln>
+            <a:noFill/>
+          </a:ln>
+        </p:spPr>
+        <p:style>
+          <a:lnRef idx="1">
+            <a:schemeClr val="accent1"/>
+          </a:lnRef>
+          <a:fillRef idx="3">
+            <a:schemeClr val="accent1"/>
+          </a:fillRef>
+          <a:effectRef idx="2">
+            <a:schemeClr val="accent1"/>
+          </a:effectRef>
+          <a:fontRef idx="minor">
+            <a:schemeClr val="lt1"/>
+          </a:fontRef>
+        </p:style>
+        <p:txBody>
+          <a:bodyPr rtlCol="0" anchor="ctr"/>
+          <a:lstStyle/>
+          <a:p>
+            <a:pPr algn="ctr"/>
+          </a:p>
+        </p:txBody>
+      </p:sp>
+      <p:sp>
+        <p:nvSpPr>
+          <p:cNvPr id="4" name="TextBox 3"/>
+          <p:cNvSpPr txBox="1"/>
+          <p:nvPr/>
+        </p:nvSpPr>
+        <p:spPr>
+          <a:xfrm>
+            <a:off x="1005840" y="1920240"/>
+            <a:ext cx="2743200" cy="914400"/>
+          </a:xfrm>
+          <a:prstGeom prst="rect">
+            <a:avLst/>
+          </a:prstGeom>
+          <a:noFill/>
+        </p:spPr>
+        <p:txBody>
+          <a:bodyPr wrap="square">
+            <a:spAutoFit/>
+          </a:bodyPr>
+          <a:lstStyle/>
+          <a:p>
+            <a:pPr algn="ctr">
+              <a:defRPr sz="5200" b="1">
+                <a:solidFill>
+                  <a:srgbClr val="34D399"/>
+                </a:solidFill>
+                <a:latin typeface="Segoe UI"/>
+              </a:defRPr>
+            </a:pPr>
+            <a:r>
+              <a:t>95%</a:t>
+            </a:r>
+          </a:p>
+        </p:txBody>
+      </p:sp>
+      <p:sp>
+        <p:nvSpPr>
+          <p:cNvPr id="5" name="TextBox 4"/>
+          <p:cNvSpPr txBox="1"/>
+          <p:nvPr/>
+        </p:nvSpPr>
+        <p:spPr>
+          <a:xfrm>
+            <a:off x="1005840" y="2834640"/>
+            <a:ext cx="2743200" cy="457200"/>
+          </a:xfrm>
+          <a:prstGeom prst="rect">
+            <a:avLst/>
+          </a:prstGeom>
+          <a:noFill/>
+        </p:spPr>
+        <p:txBody>
+          <a:bodyPr wrap="square">
+            <a:spAutoFit/>
+          </a:bodyPr>
+          <a:lstStyle/>
+          <a:p>
+            <a:pPr algn="ctr">
+              <a:defRPr sz="2200" b="0">
+                <a:solidFill>
+                  <a:srgbClr val="34D399"/>
+                </a:solidFill>
+                <a:latin typeface="Segoe UI"/>
+              </a:defRPr>
+            </a:pPr>
+            <a:r>
+              <a:t>削減</a:t>
+            </a:r>
+          </a:p>
+        </p:txBody>
+      </p:sp>
+      <p:sp>
+        <p:nvSpPr>
+          <p:cNvPr id="6" name="TextBox 5"/>
+          <p:cNvSpPr txBox="1"/>
+          <p:nvPr/>
+        </p:nvSpPr>
+        <p:spPr>
+          <a:xfrm>
+            <a:off x="1005840" y="3383280"/>
+            <a:ext cx="2743200" cy="914400"/>
+          </a:xfrm>
+          <a:prstGeom prst="rect">
+            <a:avLst/>
+          </a:prstGeom>
+          <a:noFill/>
+        </p:spPr>
+        <p:txBody>
+          <a:bodyPr wrap="square">
+            <a:spAutoFit/>
+          </a:bodyPr>
+          <a:lstStyle/>
+          <a:p>
+            <a:pPr algn="ctr">
+              <a:defRPr sz="1500" b="0">
+                <a:solidFill>
+                  <a:srgbClr val="A0A0B0"/>
+                </a:solidFill>
+                <a:latin typeface="Segoe UI"/>
+              </a:defRPr>
+            </a:pPr>
+            <a:r>
+              <a:t>ドキュメント矛盾</a:t>
+            </a:r>
+            <a:br/>
+            <a:r>
+              <a:t>検出時間</a:t>
+            </a:r>
+          </a:p>
+        </p:txBody>
+      </p:sp>
+      <p:sp>
+        <p:nvSpPr>
+          <p:cNvPr id="7" name="Rounded Rectangle 6"/>
+          <p:cNvSpPr/>
+          <p:nvPr/>
+        </p:nvSpPr>
+        <p:spPr>
+          <a:xfrm>
+            <a:off x="4389120" y="1645920"/>
+            <a:ext cx="3200400" cy="2743200"/>
+          </a:xfrm>
+          <a:prstGeom prst="roundRect">
+            <a:avLst/>
+          </a:prstGeom>
+          <a:solidFill>
+            <a:srgbClr val="1E293B"/>
+          </a:solidFill>
+          <a:ln>
+            <a:noFill/>
+          </a:ln>
+        </p:spPr>
+        <p:style>
+          <a:lnRef idx="1">
+            <a:schemeClr val="accent1"/>
+          </a:lnRef>
+          <a:fillRef idx="3">
+            <a:schemeClr val="accent1"/>
+          </a:fillRef>
+          <a:effectRef idx="2">
+            <a:schemeClr val="accent1"/>
+          </a:effectRef>
+          <a:fontRef idx="minor">
+            <a:schemeClr val="lt1"/>
+          </a:fontRef>
+        </p:style>
+        <p:txBody>
+          <a:bodyPr rtlCol="0" anchor="ctr"/>
+          <a:lstStyle/>
+          <a:p>
+            <a:pPr algn="ctr"/>
+          </a:p>
+        </p:txBody>
+      </p:sp>
+      <p:sp>
+        <p:nvSpPr>
+          <p:cNvPr id="8" name="TextBox 7"/>
+          <p:cNvSpPr txBox="1"/>
+          <p:nvPr/>
+        </p:nvSpPr>
+        <p:spPr>
+          <a:xfrm>
+            <a:off x="4663440" y="1920240"/>
+            <a:ext cx="2743200" cy="914400"/>
+          </a:xfrm>
+          <a:prstGeom prst="rect">
+            <a:avLst/>
+          </a:prstGeom>
+          <a:noFill/>
+        </p:spPr>
+        <p:txBody>
+          <a:bodyPr wrap="square">
+            <a:spAutoFit/>
+          </a:bodyPr>
+          <a:lstStyle/>
+          <a:p>
+            <a:pPr algn="ctr">
+              <a:defRPr sz="5200" b="1">
+                <a:solidFill>
+                  <a:srgbClr val="FBBF24"/>
+                </a:solidFill>
+                <a:latin typeface="Segoe UI"/>
+              </a:defRPr>
+            </a:pPr>
+            <a:r>
+              <a:t>73%</a:t>
+            </a:r>
+          </a:p>
+        </p:txBody>
+      </p:sp>
+      <p:sp>
+        <p:nvSpPr>
+          <p:cNvPr id="9" name="TextBox 8"/>
+          <p:cNvSpPr txBox="1"/>
+          <p:nvPr/>
+        </p:nvSpPr>
+        <p:spPr>
+          <a:xfrm>
+            <a:off x="4663440" y="2834640"/>
+            <a:ext cx="2743200" cy="457200"/>
+          </a:xfrm>
+          <a:prstGeom prst="rect">
+            <a:avLst/>
+          </a:prstGeom>
+          <a:noFill/>
+        </p:spPr>
+        <p:txBody>
+          <a:bodyPr wrap="square">
+            <a:spAutoFit/>
+          </a:bodyPr>
+          <a:lstStyle/>
+          <a:p>
+            <a:pPr algn="ctr">
+              <a:defRPr sz="2200" b="0">
+                <a:solidFill>
+                  <a:srgbClr val="FBBF24"/>
+                </a:solidFill>
+                <a:latin typeface="Segoe UI"/>
+              </a:defRPr>
+            </a:pPr>
+            <a:r>
+              <a:t>減少</a:t>
+            </a:r>
+          </a:p>
+        </p:txBody>
+      </p:sp>
+      <p:sp>
+        <p:nvSpPr>
+          <p:cNvPr id="10" name="TextBox 9"/>
+          <p:cNvSpPr txBox="1"/>
+          <p:nvPr/>
+        </p:nvSpPr>
+        <p:spPr>
+          <a:xfrm>
+            <a:off x="4663440" y="3383280"/>
+            <a:ext cx="2743200" cy="914400"/>
+          </a:xfrm>
+          <a:prstGeom prst="rect">
+            <a:avLst/>
+          </a:prstGeom>
+          <a:noFill/>
+        </p:spPr>
+        <p:txBody>
+          <a:bodyPr wrap="square">
+            <a:spAutoFit/>
+          </a:bodyPr>
+          <a:lstStyle/>
+          <a:p>
+            <a:pPr algn="ctr">
+              <a:defRPr sz="1500" b="0">
+                <a:solidFill>
+                  <a:srgbClr val="A0A0B0"/>
+                </a:solidFill>
+                <a:latin typeface="Segoe UI"/>
+              </a:defRPr>
+            </a:pPr>
+            <a:r>
+              <a:t>古いドキュメントによる</a:t>
+            </a:r>
+            <a:br/>
+            <a:r>
+              <a:t>顧客問い合わせ</a:t>
+            </a:r>
+          </a:p>
+        </p:txBody>
+      </p:sp>
+      <p:sp>
+        <p:nvSpPr>
+          <p:cNvPr id="11" name="Rounded Rectangle 10"/>
+          <p:cNvSpPr/>
+          <p:nvPr/>
+        </p:nvSpPr>
+        <p:spPr>
+          <a:xfrm>
+            <a:off x="8046720" y="1645920"/>
+            <a:ext cx="3200400" cy="2743200"/>
+          </a:xfrm>
+          <a:prstGeom prst="roundRect">
+            <a:avLst/>
+          </a:prstGeom>
+          <a:solidFill>
+            <a:srgbClr val="1E293B"/>
+          </a:solidFill>
+          <a:ln>
+            <a:noFill/>
+          </a:ln>
+        </p:spPr>
+        <p:style>
+          <a:lnRef idx="1">
+            <a:schemeClr val="accent1"/>
+          </a:lnRef>
+          <a:fillRef idx="3">
+            <a:schemeClr val="accent1"/>
+          </a:fillRef>
+          <a:effectRef idx="2">
+            <a:schemeClr val="accent1"/>
+          </a:effectRef>
+          <a:fontRef idx="minor">
+            <a:schemeClr val="lt1"/>
+          </a:fontRef>
+        </p:style>
+        <p:txBody>
+          <a:bodyPr rtlCol="0" anchor="ctr"/>
+          <a:lstStyle/>
+          <a:p>
+            <a:pPr algn="ctr"/>
+          </a:p>
+        </p:txBody>
+      </p:sp>
+      <p:sp>
+        <p:nvSpPr>
+          <p:cNvPr id="12" name="TextBox 11"/>
+          <p:cNvSpPr txBox="1"/>
+          <p:nvPr/>
+        </p:nvSpPr>
+        <p:spPr>
+          <a:xfrm>
+            <a:off x="8321040" y="1920240"/>
+            <a:ext cx="2743200" cy="914400"/>
+          </a:xfrm>
+          <a:prstGeom prst="rect">
+            <a:avLst/>
+          </a:prstGeom>
+          <a:noFill/>
+        </p:spPr>
+        <p:txBody>
+          <a:bodyPr wrap="square">
+            <a:spAutoFit/>
+          </a:bodyPr>
+          <a:lstStyle/>
+          <a:p>
+            <a:pPr algn="ctr">
+              <a:defRPr sz="5200" b="1">
+                <a:solidFill>
+                  <a:srgbClr val="38BDF8"/>
+                </a:solidFill>
+                <a:latin typeface="Segoe UI"/>
+              </a:defRPr>
+            </a:pPr>
+            <a:r>
+              <a:t>65→95%</a:t>
+            </a:r>
+          </a:p>
+        </p:txBody>
+      </p:sp>
+      <p:sp>
+        <p:nvSpPr>
+          <p:cNvPr id="13" name="TextBox 12"/>
+          <p:cNvSpPr txBox="1"/>
+          <p:nvPr/>
+        </p:nvSpPr>
+        <p:spPr>
+          <a:xfrm>
+            <a:off x="8321040" y="2834640"/>
+            <a:ext cx="2743200" cy="457200"/>
+          </a:xfrm>
+          <a:prstGeom prst="rect">
+            <a:avLst/>
+          </a:prstGeom>
+          <a:noFill/>
+        </p:spPr>
+        <p:txBody>
+          <a:bodyPr wrap="square">
+            <a:spAutoFit/>
+          </a:bodyPr>
+          <a:lstStyle/>
+          <a:p>
+            <a:pPr algn="ctr">
+              <a:defRPr sz="2200" b="0">
+                <a:solidFill>
+                  <a:srgbClr val="38BDF8"/>
+                </a:solidFill>
+                <a:latin typeface="Segoe UI"/>
+              </a:defRPr>
+            </a:pPr>
+            <a:r>
+              <a:t>向上</a:t>
+            </a:r>
+          </a:p>
+        </p:txBody>
+      </p:sp>
+      <p:sp>
+        <p:nvSpPr>
+          <p:cNvPr id="14" name="TextBox 13"/>
+          <p:cNvSpPr txBox="1"/>
+          <p:nvPr/>
+        </p:nvSpPr>
+        <p:spPr>
+          <a:xfrm>
+            <a:off x="8321040" y="3383280"/>
+            <a:ext cx="2743200" cy="914400"/>
+          </a:xfrm>
+          <a:prstGeom prst="rect">
+            <a:avLst/>
+          </a:prstGeom>
+          <a:noFill/>
+        </p:spPr>
+        <p:txBody>
+          <a:bodyPr wrap="square">
+            <a:spAutoFit/>
+          </a:bodyPr>
+          <a:lstStyle/>
+          <a:p>
+            <a:pPr algn="ctr">
+              <a:defRPr sz="1500" b="0">
+                <a:solidFill>
+                  <a:srgbClr val="A0A0B0"/>
+                </a:solidFill>
+                <a:latin typeface="Segoe UI"/>
+              </a:defRPr>
+            </a:pPr>
+            <a:r>
+              <a:t>ドキュメント</a:t>
+            </a:r>
+            <a:br/>
+            <a:r>
+              <a:t>品質スコア</a:t>
+            </a:r>
+          </a:p>
+        </p:txBody>
+      </p:sp>
+      <p:sp>
+        <p:nvSpPr>
+          <p:cNvPr id="15" name="Rounded Rectangle 14"/>
+          <p:cNvSpPr/>
+          <p:nvPr/>
+        </p:nvSpPr>
+        <p:spPr>
+          <a:xfrm>
+            <a:off x="731520" y="4754880"/>
+            <a:ext cx="10515600" cy="1645920"/>
+          </a:xfrm>
+          <a:prstGeom prst="roundRect">
+            <a:avLst/>
+          </a:prstGeom>
+          <a:solidFill>
+            <a:srgbClr val="1E293B"/>
+          </a:solidFill>
+          <a:ln>
+            <a:noFill/>
+          </a:ln>
+        </p:spPr>
+        <p:style>
+          <a:lnRef idx="1">
+            <a:schemeClr val="accent1"/>
+          </a:lnRef>
+          <a:fillRef idx="3">
+            <a:schemeClr val="accent1"/>
+          </a:fillRef>
+          <a:effectRef idx="2">
+            <a:schemeClr val="accent1"/>
+          </a:effectRef>
+          <a:fontRef idx="minor">
+            <a:schemeClr val="lt1"/>
+          </a:fontRef>
+        </p:style>
+        <p:txBody>
+          <a:bodyPr rtlCol="0" anchor="ctr"/>
+          <a:lstStyle/>
+          <a:p>
+            <a:pPr algn="ctr"/>
+          </a:p>
+        </p:txBody>
+      </p:sp>
+      <p:sp>
+        <p:nvSpPr>
+          <p:cNvPr id="16" name="TextBox 15"/>
+          <p:cNvSpPr txBox="1"/>
+          <p:nvPr/>
+        </p:nvSpPr>
+        <p:spPr>
+          <a:xfrm>
+            <a:off x="1097280" y="4937760"/>
+            <a:ext cx="4572000" cy="640080"/>
+          </a:xfrm>
+          <a:prstGeom prst="rect">
+            <a:avLst/>
+          </a:prstGeom>
+          <a:noFill/>
+        </p:spPr>
+        <p:txBody>
+          <a:bodyPr wrap="square">
+            <a:spAutoFit/>
+          </a:bodyPr>
+          <a:lstStyle/>
+          <a:p>
+            <a:pPr algn="l">
+              <a:defRPr sz="2200" b="1">
+                <a:solidFill>
+                  <a:srgbClr val="FFFFFF"/>
+                </a:solidFill>
+                <a:latin typeface="Segoe UI"/>
+              </a:defRPr>
+            </a:pPr>
+            <a:r>
+              <a:t>💰 年間コスト削減効果</a:t>
+            </a:r>
+          </a:p>
+        </p:txBody>
+      </p:sp>
+      <p:sp>
+        <p:nvSpPr>
+          <p:cNvPr id="17" name="TextBox 16"/>
+          <p:cNvSpPr txBox="1"/>
+          <p:nvPr/>
+        </p:nvSpPr>
+        <p:spPr>
+          <a:xfrm>
+            <a:off x="1097280" y="5486400"/>
+            <a:ext cx="4572000" cy="731520"/>
+          </a:xfrm>
+          <a:prstGeom prst="rect">
+            <a:avLst/>
+          </a:prstGeom>
+          <a:noFill/>
+        </p:spPr>
+        <p:txBody>
+          <a:bodyPr wrap="square">
+            <a:spAutoFit/>
+          </a:bodyPr>
+          <a:lstStyle/>
+          <a:p>
+            <a:pPr algn="l">
+              <a:defRPr sz="1800" b="0">
+                <a:solidFill>
+                  <a:srgbClr val="A0A0B0"/>
+                </a:solidFill>
+                <a:latin typeface="Segoe UI"/>
+              </a:defRPr>
+            </a:pPr>
+            <a:r>
+              <a:t>50人規模の組織で</a:t>
+            </a:r>
+          </a:p>
+        </p:txBody>
+      </p:sp>
+      <p:sp>
+        <p:nvSpPr>
+          <p:cNvPr id="18" name="TextBox 17"/>
+          <p:cNvSpPr txBox="1"/>
+          <p:nvPr/>
+        </p:nvSpPr>
+        <p:spPr>
+          <a:xfrm>
+            <a:off x="5943600" y="4846320"/>
+            <a:ext cx="4572000" cy="1371600"/>
+          </a:xfrm>
+          <a:prstGeom prst="rect">
+            <a:avLst/>
+          </a:prstGeom>
+          <a:noFill/>
+        </p:spPr>
+        <p:txBody>
+          <a:bodyPr wrap="square">
+            <a:spAutoFit/>
+          </a:bodyPr>
+          <a:lstStyle/>
+          <a:p>
+            <a:pPr algn="r">
+              <a:defRPr sz="5400" b="1">
+                <a:solidFill>
+                  <a:srgbClr val="34D399"/>
+                </a:solidFill>
+                <a:latin typeface="Segoe UI"/>
+              </a:defRPr>
+            </a:pPr>
+            <a:r>
+              <a:t>約480万円/年</a:t>
+            </a:r>
+          </a:p>
+        </p:txBody>
+      </p:sp>
+    </p:spTree>
+  </p:cSld>
+  <p:clrMapOvr>
+    <a:masterClrMapping/>
+  </p:clrMapOvr>
+</p:sld>
+</file>
+
+<file path=ppt/slides/slide7.xml><?xml version="1.0" encoding="utf-8"?>
 <p:sld xmlns:a="http://schemas.openxmlformats.org/drawingml/2006/main" xmlns:p="http://schemas.openxmlformats.org/presentationml/2006/main" xmlns:r="http://schemas.openxmlformats.org/officeDocument/2006/relationships">
   <p:cSld>
     <p:bg>

</xml_diff>

<commit_message>
refine: Update problem statement with credible industry statistics (Iron Mountain, IDC, Forbes)
</commit_message>
<xml_diff>
--- a/docs/demo_slides.pptx
+++ b/docs/demo_slides.pptx
@@ -3370,7 +3370,7 @@
               </a:defRPr>
             </a:pPr>
             <a:r>
-              <a:t>📊 ドキュメントの「サイレント劣化」問題</a:t>
+              <a:t>大企業が抱える「ドキュメント劣化」問題</a:t>
             </a:r>
           </a:p>
         </p:txBody>
@@ -3398,7 +3398,7 @@
           <a:lstStyle/>
           <a:p>
             <a:pPr algn="l">
-              <a:defRPr sz="1800" b="0">
+              <a:defRPr sz="1600" b="0">
                 <a:solidFill>
                   <a:srgbClr val="A0A0B0"/>
                 </a:solidFill>
@@ -3406,7 +3406,7 @@
               </a:defRPr>
             </a:pPr>
             <a:r>
-              <a:t>企業のドキュメントは作成後、静かに劣化し続けています</a:t>
+              <a:t>既存ツールでは解決できない — 差分ではなく「意味的な矛盾」を検出する技術が存在しなかった</a:t>
             </a:r>
           </a:p>
         </p:txBody>
@@ -3419,8 +3419,8 @@
         </p:nvSpPr>
         <p:spPr>
           <a:xfrm>
-            <a:off x="731520" y="2103120"/>
-            <a:ext cx="3200400" cy="3840480"/>
+            <a:off x="731520" y="1920240"/>
+            <a:ext cx="3200400" cy="4114800"/>
           </a:xfrm>
           <a:prstGeom prst="roundRect">
             <a:avLst/>
@@ -3462,7 +3462,7 @@
         </p:nvSpPr>
         <p:spPr>
           <a:xfrm>
-            <a:off x="1005840" y="2377440"/>
+            <a:off x="1005840" y="2194560"/>
             <a:ext cx="914400" cy="731520"/>
           </a:xfrm>
           <a:prstGeom prst="rect">
@@ -3485,7 +3485,7 @@
               </a:defRPr>
             </a:pPr>
             <a:r>
-              <a:t>📄</a:t>
+              <a:t>📉</a:t>
             </a:r>
           </a:p>
         </p:txBody>
@@ -3498,7 +3498,7 @@
         </p:nvSpPr>
         <p:spPr>
           <a:xfrm>
-            <a:off x="1005840" y="3200400"/>
+            <a:off x="1005840" y="3017520"/>
             <a:ext cx="2743200" cy="914400"/>
           </a:xfrm>
           <a:prstGeom prst="rect">
@@ -3521,7 +3521,7 @@
               </a:defRPr>
             </a:pPr>
             <a:r>
-              <a:t>60%</a:t>
+              <a:t>21.3%</a:t>
             </a:r>
           </a:p>
         </p:txBody>
@@ -3534,8 +3534,8 @@
         </p:nvSpPr>
         <p:spPr>
           <a:xfrm>
-            <a:off x="1005840" y="4389120"/>
-            <a:ext cx="2743200" cy="1371600"/>
+            <a:off x="1005840" y="4206240"/>
+            <a:ext cx="2743200" cy="1097280"/>
           </a:xfrm>
           <a:prstGeom prst="rect">
             <a:avLst/>
@@ -3557,29 +3557,65 @@
               </a:defRPr>
             </a:pPr>
             <a:r>
-              <a:t>のドキュメントが</a:t>
+              <a:t>の生産性が</a:t>
             </a:r>
             <a:br/>
             <a:r>
-              <a:t>作成6ヶ月後には</a:t>
+              <a:t>ドキュメント管理の</a:t>
             </a:r>
             <a:br/>
             <a:r>
-              <a:t>情報が古くなっている</a:t>
-            </a:r>
-          </a:p>
-        </p:txBody>
-      </p:sp>
-      <p:sp>
-        <p:nvSpPr>
-          <p:cNvPr id="8" name="Rounded Rectangle 7"/>
+              <a:t>非効率で失われている</a:t>
+            </a:r>
+          </a:p>
+        </p:txBody>
+      </p:sp>
+      <p:sp>
+        <p:nvSpPr>
+          <p:cNvPr id="8" name="TextBox 7"/>
+          <p:cNvSpPr txBox="1"/>
+          <p:nvPr/>
+        </p:nvSpPr>
+        <p:spPr>
+          <a:xfrm>
+            <a:off x="1005840" y="5394960"/>
+            <a:ext cx="2743200" cy="457200"/>
+          </a:xfrm>
+          <a:prstGeom prst="rect">
+            <a:avLst/>
+          </a:prstGeom>
+          <a:noFill/>
+        </p:spPr>
+        <p:txBody>
+          <a:bodyPr wrap="square">
+            <a:spAutoFit/>
+          </a:bodyPr>
+          <a:lstStyle/>
+          <a:p>
+            <a:pPr algn="l">
+              <a:defRPr sz="1100" b="0">
+                <a:solidFill>
+                  <a:srgbClr val="707080"/>
+                </a:solidFill>
+                <a:latin typeface="Segoe UI"/>
+              </a:defRPr>
+            </a:pPr>
+            <a:r>
+              <a:t>Iron Mountain 調査</a:t>
+            </a:r>
+          </a:p>
+        </p:txBody>
+      </p:sp>
+      <p:sp>
+        <p:nvSpPr>
+          <p:cNvPr id="9" name="Rounded Rectangle 8"/>
           <p:cNvSpPr/>
           <p:nvPr/>
         </p:nvSpPr>
         <p:spPr>
           <a:xfrm>
-            <a:off x="4389120" y="2103120"/>
-            <a:ext cx="3200400" cy="3840480"/>
+            <a:off x="4389120" y="1920240"/>
+            <a:ext cx="3200400" cy="4114800"/>
           </a:xfrm>
           <a:prstGeom prst="roundRect">
             <a:avLst/>
@@ -3615,13 +3651,13 @@
       </p:sp>
       <p:sp>
         <p:nvSpPr>
-          <p:cNvPr id="9" name="TextBox 8"/>
+          <p:cNvPr id="10" name="TextBox 9"/>
           <p:cNvSpPr txBox="1"/>
           <p:nvPr/>
         </p:nvSpPr>
         <p:spPr>
           <a:xfrm>
-            <a:off x="4663440" y="2377440"/>
+            <a:off x="4663440" y="2194560"/>
             <a:ext cx="914400" cy="731520"/>
           </a:xfrm>
           <a:prstGeom prst="rect">
@@ -3644,20 +3680,20 @@
               </a:defRPr>
             </a:pPr>
             <a:r>
-              <a:t>⚠️</a:t>
-            </a:r>
-          </a:p>
-        </p:txBody>
-      </p:sp>
-      <p:sp>
-        <p:nvSpPr>
-          <p:cNvPr id="10" name="TextBox 9"/>
+              <a:t>💰</a:t>
+            </a:r>
+          </a:p>
+        </p:txBody>
+      </p:sp>
+      <p:sp>
+        <p:nvSpPr>
+          <p:cNvPr id="11" name="TextBox 10"/>
           <p:cNvSpPr txBox="1"/>
           <p:nvPr/>
         </p:nvSpPr>
         <p:spPr>
           <a:xfrm>
-            <a:off x="4663440" y="3200400"/>
+            <a:off x="4663440" y="3017520"/>
             <a:ext cx="2743200" cy="914400"/>
           </a:xfrm>
           <a:prstGeom prst="rect">
@@ -3680,21 +3716,21 @@
               </a:defRPr>
             </a:pPr>
             <a:r>
-              <a:t>73%</a:t>
-            </a:r>
-          </a:p>
-        </p:txBody>
-      </p:sp>
-      <p:sp>
-        <p:nvSpPr>
-          <p:cNvPr id="11" name="TextBox 10"/>
+              <a:t>$19,732</a:t>
+            </a:r>
+          </a:p>
+        </p:txBody>
+      </p:sp>
+      <p:sp>
+        <p:nvSpPr>
+          <p:cNvPr id="12" name="TextBox 11"/>
           <p:cNvSpPr txBox="1"/>
           <p:nvPr/>
         </p:nvSpPr>
         <p:spPr>
           <a:xfrm>
-            <a:off x="4663440" y="4389120"/>
-            <a:ext cx="2743200" cy="1371600"/>
+            <a:off x="4663440" y="4206240"/>
+            <a:ext cx="2743200" cy="1097280"/>
           </a:xfrm>
           <a:prstGeom prst="rect">
             <a:avLst/>
@@ -3716,29 +3752,65 @@
               </a:defRPr>
             </a:pPr>
             <a:r>
-              <a:t>のユーザーが</a:t>
+              <a:t>/人・年のコストが</a:t>
             </a:r>
             <a:br/>
             <a:r>
-              <a:t>古い手順書で</a:t>
+              <a:t>情報検索・文書管理に</a:t>
             </a:r>
             <a:br/>
             <a:r>
-              <a:t>作業ミスを経験</a:t>
-            </a:r>
-          </a:p>
-        </p:txBody>
-      </p:sp>
-      <p:sp>
-        <p:nvSpPr>
-          <p:cNvPr id="12" name="Rounded Rectangle 11"/>
+              <a:t>費やされている</a:t>
+            </a:r>
+          </a:p>
+        </p:txBody>
+      </p:sp>
+      <p:sp>
+        <p:nvSpPr>
+          <p:cNvPr id="13" name="TextBox 12"/>
+          <p:cNvSpPr txBox="1"/>
+          <p:nvPr/>
+        </p:nvSpPr>
+        <p:spPr>
+          <a:xfrm>
+            <a:off x="4663440" y="5394960"/>
+            <a:ext cx="2743200" cy="457200"/>
+          </a:xfrm>
+          <a:prstGeom prst="rect">
+            <a:avLst/>
+          </a:prstGeom>
+          <a:noFill/>
+        </p:spPr>
+        <p:txBody>
+          <a:bodyPr wrap="square">
+            <a:spAutoFit/>
+          </a:bodyPr>
+          <a:lstStyle/>
+          <a:p>
+            <a:pPr algn="l">
+              <a:defRPr sz="1100" b="0">
+                <a:solidFill>
+                  <a:srgbClr val="707080"/>
+                </a:solidFill>
+                <a:latin typeface="Segoe UI"/>
+              </a:defRPr>
+            </a:pPr>
+            <a:r>
+              <a:t>IDC / Ripcord 調査</a:t>
+            </a:r>
+          </a:p>
+        </p:txBody>
+      </p:sp>
+      <p:sp>
+        <p:nvSpPr>
+          <p:cNvPr id="14" name="Rounded Rectangle 13"/>
           <p:cNvSpPr/>
           <p:nvPr/>
         </p:nvSpPr>
         <p:spPr>
           <a:xfrm>
-            <a:off x="8046720" y="2103120"/>
-            <a:ext cx="3200400" cy="3840480"/>
+            <a:off x="8046720" y="1920240"/>
+            <a:ext cx="3200400" cy="4114800"/>
           </a:xfrm>
           <a:prstGeom prst="roundRect">
             <a:avLst/>
@@ -3774,13 +3846,13 @@
       </p:sp>
       <p:sp>
         <p:nvSpPr>
-          <p:cNvPr id="13" name="TextBox 12"/>
+          <p:cNvPr id="15" name="TextBox 14"/>
           <p:cNvSpPr txBox="1"/>
           <p:nvPr/>
         </p:nvSpPr>
         <p:spPr>
           <a:xfrm>
-            <a:off x="8321040" y="2377440"/>
+            <a:off x="8321040" y="2194560"/>
             <a:ext cx="914400" cy="731520"/>
           </a:xfrm>
           <a:prstGeom prst="rect">
@@ -3803,20 +3875,20 @@
               </a:defRPr>
             </a:pPr>
             <a:r>
-              <a:t>💰</a:t>
-            </a:r>
-          </a:p>
-        </p:txBody>
-      </p:sp>
-      <p:sp>
-        <p:nvSpPr>
-          <p:cNvPr id="14" name="TextBox 13"/>
+              <a:t>⏱️</a:t>
+            </a:r>
+          </a:p>
+        </p:txBody>
+      </p:sp>
+      <p:sp>
+        <p:nvSpPr>
+          <p:cNvPr id="16" name="TextBox 15"/>
           <p:cNvSpPr txBox="1"/>
           <p:nvPr/>
         </p:nvSpPr>
         <p:spPr>
           <a:xfrm>
-            <a:off x="8321040" y="3200400"/>
+            <a:off x="8321040" y="3017520"/>
             <a:ext cx="2743200" cy="914400"/>
           </a:xfrm>
           <a:prstGeom prst="rect">
@@ -3839,21 +3911,21 @@
               </a:defRPr>
             </a:pPr>
             <a:r>
-              <a:t>¥480万/年</a:t>
-            </a:r>
-          </a:p>
-        </p:txBody>
-      </p:sp>
-      <p:sp>
-        <p:nvSpPr>
-          <p:cNvPr id="15" name="TextBox 14"/>
+              <a:t>2.5h/日</a:t>
+            </a:r>
+          </a:p>
+        </p:txBody>
+      </p:sp>
+      <p:sp>
+        <p:nvSpPr>
+          <p:cNvPr id="17" name="TextBox 16"/>
           <p:cNvSpPr txBox="1"/>
           <p:nvPr/>
         </p:nvSpPr>
         <p:spPr>
           <a:xfrm>
-            <a:off x="8321040" y="4389120"/>
-            <a:ext cx="2743200" cy="1371600"/>
+            <a:off x="8321040" y="4206240"/>
+            <a:ext cx="2743200" cy="1097280"/>
           </a:xfrm>
           <a:prstGeom prst="rect">
             <a:avLst/>
@@ -3875,15 +3947,51 @@
               </a:defRPr>
             </a:pPr>
             <a:r>
-              <a:t>の損失が</a:t>
+              <a:t>を従業員が</a:t>
             </a:r>
             <a:br/>
             <a:r>
-              <a:t>ドキュメント劣化による</a:t>
+              <a:t>必要な情報の検索に</a:t>
             </a:r>
             <a:br/>
             <a:r>
-              <a:t>業務ロスで発生</a:t>
+              <a:t>費やしている</a:t>
+            </a:r>
+          </a:p>
+        </p:txBody>
+      </p:sp>
+      <p:sp>
+        <p:nvSpPr>
+          <p:cNvPr id="18" name="TextBox 17"/>
+          <p:cNvSpPr txBox="1"/>
+          <p:nvPr/>
+        </p:nvSpPr>
+        <p:spPr>
+          <a:xfrm>
+            <a:off x="8321040" y="5394960"/>
+            <a:ext cx="2743200" cy="457200"/>
+          </a:xfrm>
+          <a:prstGeom prst="rect">
+            <a:avLst/>
+          </a:prstGeom>
+          <a:noFill/>
+        </p:spPr>
+        <p:txBody>
+          <a:bodyPr wrap="square">
+            <a:spAutoFit/>
+          </a:bodyPr>
+          <a:lstStyle/>
+          <a:p>
+            <a:pPr algn="l">
+              <a:defRPr sz="1100" b="0">
+                <a:solidFill>
+                  <a:srgbClr val="707080"/>
+                </a:solidFill>
+                <a:latin typeface="Segoe UI"/>
+              </a:defRPr>
+            </a:pPr>
+            <a:r>
+              <a:t>Forbes / McKinsey</a:t>
             </a:r>
           </a:p>
         </p:txBody>

</xml_diff>